<commit_message>
New ProANUBIS data from early April, following LHC luminosity tests
</commit_message>
<xml_diff>
--- a/ProAnubis_CERN/Investigations/Pictures.pptx
+++ b/ProAnubis_CERN/Investigations/Pictures.pptx
@@ -6,14 +6,22 @@
   </p:sldMasterIdLst>
   <p:sldIdLst>
     <p:sldId id="256" r:id="rId2"/>
-    <p:sldId id="257" r:id="rId3"/>
-    <p:sldId id="258" r:id="rId4"/>
-    <p:sldId id="264" r:id="rId5"/>
-    <p:sldId id="263" r:id="rId6"/>
-    <p:sldId id="259" r:id="rId7"/>
-    <p:sldId id="262" r:id="rId8"/>
-    <p:sldId id="260" r:id="rId9"/>
-    <p:sldId id="261" r:id="rId10"/>
+    <p:sldId id="258" r:id="rId3"/>
+    <p:sldId id="264" r:id="rId4"/>
+    <p:sldId id="263" r:id="rId5"/>
+    <p:sldId id="259" r:id="rId6"/>
+    <p:sldId id="262" r:id="rId7"/>
+    <p:sldId id="260" r:id="rId8"/>
+    <p:sldId id="261" r:id="rId9"/>
+    <p:sldId id="265" r:id="rId10"/>
+    <p:sldId id="266" r:id="rId11"/>
+    <p:sldId id="268" r:id="rId12"/>
+    <p:sldId id="267" r:id="rId13"/>
+    <p:sldId id="272" r:id="rId14"/>
+    <p:sldId id="270" r:id="rId15"/>
+    <p:sldId id="271" r:id="rId16"/>
+    <p:sldId id="273" r:id="rId17"/>
+    <p:sldId id="274" r:id="rId18"/>
   </p:sldIdLst>
   <p:sldSz cx="12192000" cy="6858000"/>
   <p:notesSz cx="6858000" cy="9144000"/>
@@ -269,7 +277,7 @@
           <a:p>
             <a:fld id="{E5CD7F21-7705-4AEC-A4A7-4DEA968EC517}" type="datetimeFigureOut">
               <a:rPr lang="en-GB" smtClean="0"/>
-              <a:t>25/03/2024</a:t>
+              <a:t>05/04/2024</a:t>
             </a:fld>
             <a:endParaRPr lang="en-GB"/>
           </a:p>
@@ -469,7 +477,7 @@
           <a:p>
             <a:fld id="{E5CD7F21-7705-4AEC-A4A7-4DEA968EC517}" type="datetimeFigureOut">
               <a:rPr lang="en-GB" smtClean="0"/>
-              <a:t>25/03/2024</a:t>
+              <a:t>05/04/2024</a:t>
             </a:fld>
             <a:endParaRPr lang="en-GB"/>
           </a:p>
@@ -679,7 +687,7 @@
           <a:p>
             <a:fld id="{E5CD7F21-7705-4AEC-A4A7-4DEA968EC517}" type="datetimeFigureOut">
               <a:rPr lang="en-GB" smtClean="0"/>
-              <a:t>25/03/2024</a:t>
+              <a:t>05/04/2024</a:t>
             </a:fld>
             <a:endParaRPr lang="en-GB"/>
           </a:p>
@@ -879,7 +887,7 @@
           <a:p>
             <a:fld id="{E5CD7F21-7705-4AEC-A4A7-4DEA968EC517}" type="datetimeFigureOut">
               <a:rPr lang="en-GB" smtClean="0"/>
-              <a:t>25/03/2024</a:t>
+              <a:t>05/04/2024</a:t>
             </a:fld>
             <a:endParaRPr lang="en-GB"/>
           </a:p>
@@ -1155,7 +1163,7 @@
           <a:p>
             <a:fld id="{E5CD7F21-7705-4AEC-A4A7-4DEA968EC517}" type="datetimeFigureOut">
               <a:rPr lang="en-GB" smtClean="0"/>
-              <a:t>25/03/2024</a:t>
+              <a:t>05/04/2024</a:t>
             </a:fld>
             <a:endParaRPr lang="en-GB"/>
           </a:p>
@@ -1423,7 +1431,7 @@
           <a:p>
             <a:fld id="{E5CD7F21-7705-4AEC-A4A7-4DEA968EC517}" type="datetimeFigureOut">
               <a:rPr lang="en-GB" smtClean="0"/>
-              <a:t>25/03/2024</a:t>
+              <a:t>05/04/2024</a:t>
             </a:fld>
             <a:endParaRPr lang="en-GB"/>
           </a:p>
@@ -1838,7 +1846,7 @@
           <a:p>
             <a:fld id="{E5CD7F21-7705-4AEC-A4A7-4DEA968EC517}" type="datetimeFigureOut">
               <a:rPr lang="en-GB" smtClean="0"/>
-              <a:t>25/03/2024</a:t>
+              <a:t>05/04/2024</a:t>
             </a:fld>
             <a:endParaRPr lang="en-GB"/>
           </a:p>
@@ -1980,7 +1988,7 @@
           <a:p>
             <a:fld id="{E5CD7F21-7705-4AEC-A4A7-4DEA968EC517}" type="datetimeFigureOut">
               <a:rPr lang="en-GB" smtClean="0"/>
-              <a:t>25/03/2024</a:t>
+              <a:t>05/04/2024</a:t>
             </a:fld>
             <a:endParaRPr lang="en-GB"/>
           </a:p>
@@ -2093,7 +2101,7 @@
           <a:p>
             <a:fld id="{E5CD7F21-7705-4AEC-A4A7-4DEA968EC517}" type="datetimeFigureOut">
               <a:rPr lang="en-GB" smtClean="0"/>
-              <a:t>25/03/2024</a:t>
+              <a:t>05/04/2024</a:t>
             </a:fld>
             <a:endParaRPr lang="en-GB"/>
           </a:p>
@@ -2406,7 +2414,7 @@
           <a:p>
             <a:fld id="{E5CD7F21-7705-4AEC-A4A7-4DEA968EC517}" type="datetimeFigureOut">
               <a:rPr lang="en-GB" smtClean="0"/>
-              <a:t>25/03/2024</a:t>
+              <a:t>05/04/2024</a:t>
             </a:fld>
             <a:endParaRPr lang="en-GB"/>
           </a:p>
@@ -2695,7 +2703,7 @@
           <a:p>
             <a:fld id="{E5CD7F21-7705-4AEC-A4A7-4DEA968EC517}" type="datetimeFigureOut">
               <a:rPr lang="en-GB" smtClean="0"/>
-              <a:t>25/03/2024</a:t>
+              <a:t>05/04/2024</a:t>
             </a:fld>
             <a:endParaRPr lang="en-GB"/>
           </a:p>
@@ -2938,7 +2946,7 @@
           <a:p>
             <a:fld id="{E5CD7F21-7705-4AEC-A4A7-4DEA968EC517}" type="datetimeFigureOut">
               <a:rPr lang="en-GB" smtClean="0"/>
-              <a:t>25/03/2024</a:t>
+              <a:t>05/04/2024</a:t>
             </a:fld>
             <a:endParaRPr lang="en-GB"/>
           </a:p>
@@ -3403,6 +3411,617 @@
 </p:sld>
 </file>
 
+<file path=ppt/slides/slide10.xml><?xml version="1.0" encoding="utf-8"?>
+<p:sld xmlns:a="http://schemas.openxmlformats.org/drawingml/2006/main" xmlns:r="http://schemas.openxmlformats.org/officeDocument/2006/relationships" xmlns:p="http://schemas.openxmlformats.org/presentationml/2006/main">
+  <p:cSld>
+    <p:spTree>
+      <p:nvGrpSpPr>
+        <p:cNvPr id="1" name=""/>
+        <p:cNvGrpSpPr/>
+        <p:nvPr/>
+      </p:nvGrpSpPr>
+      <p:grpSpPr>
+        <a:xfrm>
+          <a:off x="0" y="0"/>
+          <a:ext cx="0" cy="0"/>
+          <a:chOff x="0" y="0"/>
+          <a:chExt cx="0" cy="0"/>
+        </a:xfrm>
+      </p:grpSpPr>
+      <p:pic>
+        <p:nvPicPr>
+          <p:cNvPr id="3" name="Picture 2">
+            <a:extLst>
+              <a:ext uri="{FF2B5EF4-FFF2-40B4-BE49-F238E27FC236}">
+                <a16:creationId xmlns:a16="http://schemas.microsoft.com/office/drawing/2014/main" id="{740838A0-C6B1-B902-296D-15D0A59D2396}"/>
+              </a:ext>
+            </a:extLst>
+          </p:cNvPr>
+          <p:cNvPicPr>
+            <a:picLocks noChangeAspect="1"/>
+          </p:cNvPicPr>
+          <p:nvPr/>
+        </p:nvPicPr>
+        <p:blipFill>
+          <a:blip r:embed="rId2"/>
+          <a:stretch>
+            <a:fillRect/>
+          </a:stretch>
+        </p:blipFill>
+        <p:spPr>
+          <a:xfrm>
+            <a:off x="1360540" y="-79416"/>
+            <a:ext cx="9353474" cy="6858000"/>
+          </a:xfrm>
+          <a:prstGeom prst="rect">
+            <a:avLst/>
+          </a:prstGeom>
+        </p:spPr>
+      </p:pic>
+      <p:pic>
+        <p:nvPicPr>
+          <p:cNvPr id="5" name="Picture 4">
+            <a:extLst>
+              <a:ext uri="{FF2B5EF4-FFF2-40B4-BE49-F238E27FC236}">
+                <a16:creationId xmlns:a16="http://schemas.microsoft.com/office/drawing/2014/main" id="{A94A4963-2660-7CC2-BFB8-E34E9CFB0C05}"/>
+              </a:ext>
+            </a:extLst>
+          </p:cNvPr>
+          <p:cNvPicPr>
+            <a:picLocks noChangeAspect="1"/>
+          </p:cNvPicPr>
+          <p:nvPr/>
+        </p:nvPicPr>
+        <p:blipFill>
+          <a:blip r:embed="rId3"/>
+          <a:stretch>
+            <a:fillRect/>
+          </a:stretch>
+        </p:blipFill>
+        <p:spPr>
+          <a:xfrm>
+            <a:off x="2204595" y="762859"/>
+            <a:ext cx="463614" cy="484803"/>
+          </a:xfrm>
+          <a:prstGeom prst="rect">
+            <a:avLst/>
+          </a:prstGeom>
+        </p:spPr>
+      </p:pic>
+    </p:spTree>
+    <p:extLst>
+      <p:ext uri="{BB962C8B-B14F-4D97-AF65-F5344CB8AC3E}">
+        <p14:creationId xmlns:p14="http://schemas.microsoft.com/office/powerpoint/2010/main" val="1036387432"/>
+      </p:ext>
+    </p:extLst>
+  </p:cSld>
+  <p:clrMapOvr>
+    <a:masterClrMapping/>
+  </p:clrMapOvr>
+</p:sld>
+</file>
+
+<file path=ppt/slides/slide11.xml><?xml version="1.0" encoding="utf-8"?>
+<p:sld xmlns:a="http://schemas.openxmlformats.org/drawingml/2006/main" xmlns:r="http://schemas.openxmlformats.org/officeDocument/2006/relationships" xmlns:p="http://schemas.openxmlformats.org/presentationml/2006/main">
+  <p:cSld>
+    <p:spTree>
+      <p:nvGrpSpPr>
+        <p:cNvPr id="1" name=""/>
+        <p:cNvGrpSpPr/>
+        <p:nvPr/>
+      </p:nvGrpSpPr>
+      <p:grpSpPr>
+        <a:xfrm>
+          <a:off x="0" y="0"/>
+          <a:ext cx="0" cy="0"/>
+          <a:chOff x="0" y="0"/>
+          <a:chExt cx="0" cy="0"/>
+        </a:xfrm>
+      </p:grpSpPr>
+      <p:sp>
+        <p:nvSpPr>
+          <p:cNvPr id="2" name="Title 1">
+            <a:extLst>
+              <a:ext uri="{FF2B5EF4-FFF2-40B4-BE49-F238E27FC236}">
+                <a16:creationId xmlns:a16="http://schemas.microsoft.com/office/drawing/2014/main" id="{550AD8C3-AF41-E164-D965-AE8216A6CB17}"/>
+              </a:ext>
+            </a:extLst>
+          </p:cNvPr>
+          <p:cNvSpPr>
+            <a:spLocks noGrp="1"/>
+          </p:cNvSpPr>
+          <p:nvPr>
+            <p:ph type="title"/>
+          </p:nvPr>
+        </p:nvSpPr>
+        <p:spPr/>
+        <p:txBody>
+          <a:bodyPr/>
+          <a:lstStyle/>
+          <a:p>
+            <a:r>
+              <a:rPr lang="en-GB" dirty="0" err="1"/>
+              <a:t>ProANUBIS</a:t>
+            </a:r>
+            <a:r>
+              <a:rPr lang="en-GB" dirty="0"/>
+              <a:t> during ATLAS luminosity event</a:t>
+            </a:r>
+          </a:p>
+        </p:txBody>
+      </p:sp>
+      <p:pic>
+        <p:nvPicPr>
+          <p:cNvPr id="1026" name="Picture 2" descr="Image preview">
+            <a:extLst>
+              <a:ext uri="{FF2B5EF4-FFF2-40B4-BE49-F238E27FC236}">
+                <a16:creationId xmlns:a16="http://schemas.microsoft.com/office/drawing/2014/main" id="{D23C93CF-3046-2BC0-BFCD-1CC5CBB07996}"/>
+              </a:ext>
+            </a:extLst>
+          </p:cNvPr>
+          <p:cNvPicPr>
+            <a:picLocks noChangeAspect="1" noChangeArrowheads="1"/>
+          </p:cNvPicPr>
+          <p:nvPr/>
+        </p:nvPicPr>
+        <p:blipFill>
+          <a:blip r:embed="rId2">
+            <a:extLst>
+              <a:ext uri="{28A0092B-C50C-407E-A947-70E740481C1C}">
+                <a14:useLocalDpi xmlns:a14="http://schemas.microsoft.com/office/drawing/2010/main" val="0"/>
+              </a:ext>
+            </a:extLst>
+          </a:blip>
+          <a:srcRect/>
+          <a:stretch>
+            <a:fillRect/>
+          </a:stretch>
+        </p:blipFill>
+        <p:spPr bwMode="auto">
+          <a:xfrm>
+            <a:off x="1123950" y="1772444"/>
+            <a:ext cx="8915400" cy="4457700"/>
+          </a:xfrm>
+          <a:prstGeom prst="rect">
+            <a:avLst/>
+          </a:prstGeom>
+          <a:noFill/>
+          <a:extLst>
+            <a:ext uri="{909E8E84-426E-40DD-AFC4-6F175D3DCCD1}">
+              <a14:hiddenFill xmlns:a14="http://schemas.microsoft.com/office/drawing/2010/main">
+                <a:solidFill>
+                  <a:srgbClr val="FFFFFF"/>
+                </a:solidFill>
+              </a14:hiddenFill>
+            </a:ext>
+          </a:extLst>
+        </p:spPr>
+      </p:pic>
+      <p:sp>
+        <p:nvSpPr>
+          <p:cNvPr id="4" name="Oval 3">
+            <a:extLst>
+              <a:ext uri="{FF2B5EF4-FFF2-40B4-BE49-F238E27FC236}">
+                <a16:creationId xmlns:a16="http://schemas.microsoft.com/office/drawing/2014/main" id="{D722B249-878E-71A4-6C2E-9AEA0FB9C84A}"/>
+              </a:ext>
+            </a:extLst>
+          </p:cNvPr>
+          <p:cNvSpPr/>
+          <p:nvPr/>
+        </p:nvSpPr>
+        <p:spPr>
+          <a:xfrm>
+            <a:off x="3167849" y="2077830"/>
+            <a:ext cx="1362075" cy="3619500"/>
+          </a:xfrm>
+          <a:prstGeom prst="ellipse">
+            <a:avLst/>
+          </a:prstGeom>
+          <a:solidFill>
+            <a:schemeClr val="accent6">
+              <a:alpha val="50000"/>
+            </a:schemeClr>
+          </a:solidFill>
+          <a:ln>
+            <a:noFill/>
+          </a:ln>
+        </p:spPr>
+        <p:style>
+          <a:lnRef idx="0">
+            <a:scrgbClr r="0" g="0" b="0"/>
+          </a:lnRef>
+          <a:fillRef idx="0">
+            <a:scrgbClr r="0" g="0" b="0"/>
+          </a:fillRef>
+          <a:effectRef idx="0">
+            <a:scrgbClr r="0" g="0" b="0"/>
+          </a:effectRef>
+          <a:fontRef idx="minor">
+            <a:schemeClr val="lt1"/>
+          </a:fontRef>
+        </p:style>
+        <p:txBody>
+          <a:bodyPr rtlCol="0" anchor="ctr"/>
+          <a:lstStyle/>
+          <a:p>
+            <a:pPr algn="ctr"/>
+            <a:endParaRPr lang="en-GB"/>
+          </a:p>
+        </p:txBody>
+      </p:sp>
+    </p:spTree>
+    <p:extLst>
+      <p:ext uri="{BB962C8B-B14F-4D97-AF65-F5344CB8AC3E}">
+        <p14:creationId xmlns:p14="http://schemas.microsoft.com/office/powerpoint/2010/main" val="3143387710"/>
+      </p:ext>
+    </p:extLst>
+  </p:cSld>
+  <p:clrMapOvr>
+    <a:masterClrMapping/>
+  </p:clrMapOvr>
+</p:sld>
+</file>
+
+<file path=ppt/slides/slide12.xml><?xml version="1.0" encoding="utf-8"?>
+<p:sld xmlns:a="http://schemas.openxmlformats.org/drawingml/2006/main" xmlns:r="http://schemas.openxmlformats.org/officeDocument/2006/relationships" xmlns:p="http://schemas.openxmlformats.org/presentationml/2006/main">
+  <p:cSld>
+    <p:spTree>
+      <p:nvGrpSpPr>
+        <p:cNvPr id="1" name=""/>
+        <p:cNvGrpSpPr/>
+        <p:nvPr/>
+      </p:nvGrpSpPr>
+      <p:grpSpPr>
+        <a:xfrm>
+          <a:off x="0" y="0"/>
+          <a:ext cx="0" cy="0"/>
+          <a:chOff x="0" y="0"/>
+          <a:chExt cx="0" cy="0"/>
+        </a:xfrm>
+      </p:grpSpPr>
+      <p:pic>
+        <p:nvPicPr>
+          <p:cNvPr id="7" name="Picture 6">
+            <a:extLst>
+              <a:ext uri="{FF2B5EF4-FFF2-40B4-BE49-F238E27FC236}">
+                <a16:creationId xmlns:a16="http://schemas.microsoft.com/office/drawing/2014/main" id="{A2192F08-5E3B-A3DF-FA09-ECA687530295}"/>
+              </a:ext>
+            </a:extLst>
+          </p:cNvPr>
+          <p:cNvPicPr>
+            <a:picLocks noChangeAspect="1"/>
+          </p:cNvPicPr>
+          <p:nvPr/>
+        </p:nvPicPr>
+        <p:blipFill>
+          <a:blip r:embed="rId2"/>
+          <a:stretch>
+            <a:fillRect/>
+          </a:stretch>
+        </p:blipFill>
+        <p:spPr>
+          <a:xfrm>
+            <a:off x="775271" y="19050"/>
+            <a:ext cx="10641458" cy="6858000"/>
+          </a:xfrm>
+          <a:prstGeom prst="rect">
+            <a:avLst/>
+          </a:prstGeom>
+        </p:spPr>
+      </p:pic>
+    </p:spTree>
+    <p:extLst>
+      <p:ext uri="{BB962C8B-B14F-4D97-AF65-F5344CB8AC3E}">
+        <p14:creationId xmlns:p14="http://schemas.microsoft.com/office/powerpoint/2010/main" val="3246124796"/>
+      </p:ext>
+    </p:extLst>
+  </p:cSld>
+  <p:clrMapOvr>
+    <a:masterClrMapping/>
+  </p:clrMapOvr>
+</p:sld>
+</file>
+
+<file path=ppt/slides/slide13.xml><?xml version="1.0" encoding="utf-8"?>
+<p:sld xmlns:a="http://schemas.openxmlformats.org/drawingml/2006/main" xmlns:r="http://schemas.openxmlformats.org/officeDocument/2006/relationships" xmlns:p="http://schemas.openxmlformats.org/presentationml/2006/main">
+  <p:cSld>
+    <p:spTree>
+      <p:nvGrpSpPr>
+        <p:cNvPr id="1" name=""/>
+        <p:cNvGrpSpPr/>
+        <p:nvPr/>
+      </p:nvGrpSpPr>
+      <p:grpSpPr>
+        <a:xfrm>
+          <a:off x="0" y="0"/>
+          <a:ext cx="0" cy="0"/>
+          <a:chOff x="0" y="0"/>
+          <a:chExt cx="0" cy="0"/>
+        </a:xfrm>
+      </p:grpSpPr>
+      <p:pic>
+        <p:nvPicPr>
+          <p:cNvPr id="3" name="Picture 2">
+            <a:extLst>
+              <a:ext uri="{FF2B5EF4-FFF2-40B4-BE49-F238E27FC236}">
+                <a16:creationId xmlns:a16="http://schemas.microsoft.com/office/drawing/2014/main" id="{AC4EEDDB-7B83-7E59-BFF4-1C087D202D7B}"/>
+              </a:ext>
+            </a:extLst>
+          </p:cNvPr>
+          <p:cNvPicPr>
+            <a:picLocks noChangeAspect="1"/>
+          </p:cNvPicPr>
+          <p:nvPr/>
+        </p:nvPicPr>
+        <p:blipFill>
+          <a:blip r:embed="rId2"/>
+          <a:stretch>
+            <a:fillRect/>
+          </a:stretch>
+        </p:blipFill>
+        <p:spPr>
+          <a:xfrm>
+            <a:off x="775271" y="0"/>
+            <a:ext cx="10641458" cy="6858000"/>
+          </a:xfrm>
+          <a:prstGeom prst="rect">
+            <a:avLst/>
+          </a:prstGeom>
+        </p:spPr>
+      </p:pic>
+    </p:spTree>
+    <p:extLst>
+      <p:ext uri="{BB962C8B-B14F-4D97-AF65-F5344CB8AC3E}">
+        <p14:creationId xmlns:p14="http://schemas.microsoft.com/office/powerpoint/2010/main" val="3854975292"/>
+      </p:ext>
+    </p:extLst>
+  </p:cSld>
+  <p:clrMapOvr>
+    <a:masterClrMapping/>
+  </p:clrMapOvr>
+</p:sld>
+</file>
+
+<file path=ppt/slides/slide14.xml><?xml version="1.0" encoding="utf-8"?>
+<p:sld xmlns:a="http://schemas.openxmlformats.org/drawingml/2006/main" xmlns:r="http://schemas.openxmlformats.org/officeDocument/2006/relationships" xmlns:p="http://schemas.openxmlformats.org/presentationml/2006/main">
+  <p:cSld>
+    <p:spTree>
+      <p:nvGrpSpPr>
+        <p:cNvPr id="1" name=""/>
+        <p:cNvGrpSpPr/>
+        <p:nvPr/>
+      </p:nvGrpSpPr>
+      <p:grpSpPr>
+        <a:xfrm>
+          <a:off x="0" y="0"/>
+          <a:ext cx="0" cy="0"/>
+          <a:chOff x="0" y="0"/>
+          <a:chExt cx="0" cy="0"/>
+        </a:xfrm>
+      </p:grpSpPr>
+      <p:pic>
+        <p:nvPicPr>
+          <p:cNvPr id="7" name="Picture 6">
+            <a:extLst>
+              <a:ext uri="{FF2B5EF4-FFF2-40B4-BE49-F238E27FC236}">
+                <a16:creationId xmlns:a16="http://schemas.microsoft.com/office/drawing/2014/main" id="{10B69B05-62EF-071A-90B7-185AA324F1AB}"/>
+              </a:ext>
+            </a:extLst>
+          </p:cNvPr>
+          <p:cNvPicPr>
+            <a:picLocks noChangeAspect="1"/>
+          </p:cNvPicPr>
+          <p:nvPr/>
+        </p:nvPicPr>
+        <p:blipFill>
+          <a:blip r:embed="rId2"/>
+          <a:stretch>
+            <a:fillRect/>
+          </a:stretch>
+        </p:blipFill>
+        <p:spPr>
+          <a:xfrm>
+            <a:off x="825357" y="0"/>
+            <a:ext cx="10541285" cy="6858000"/>
+          </a:xfrm>
+          <a:prstGeom prst="rect">
+            <a:avLst/>
+          </a:prstGeom>
+        </p:spPr>
+      </p:pic>
+    </p:spTree>
+    <p:extLst>
+      <p:ext uri="{BB962C8B-B14F-4D97-AF65-F5344CB8AC3E}">
+        <p14:creationId xmlns:p14="http://schemas.microsoft.com/office/powerpoint/2010/main" val="3681602122"/>
+      </p:ext>
+    </p:extLst>
+  </p:cSld>
+  <p:clrMapOvr>
+    <a:masterClrMapping/>
+  </p:clrMapOvr>
+</p:sld>
+</file>
+
+<file path=ppt/slides/slide15.xml><?xml version="1.0" encoding="utf-8"?>
+<p:sld xmlns:a="http://schemas.openxmlformats.org/drawingml/2006/main" xmlns:r="http://schemas.openxmlformats.org/officeDocument/2006/relationships" xmlns:p="http://schemas.openxmlformats.org/presentationml/2006/main">
+  <p:cSld>
+    <p:spTree>
+      <p:nvGrpSpPr>
+        <p:cNvPr id="1" name=""/>
+        <p:cNvGrpSpPr/>
+        <p:nvPr/>
+      </p:nvGrpSpPr>
+      <p:grpSpPr>
+        <a:xfrm>
+          <a:off x="0" y="0"/>
+          <a:ext cx="0" cy="0"/>
+          <a:chOff x="0" y="0"/>
+          <a:chExt cx="0" cy="0"/>
+        </a:xfrm>
+      </p:grpSpPr>
+      <p:pic>
+        <p:nvPicPr>
+          <p:cNvPr id="5" name="Picture 4">
+            <a:extLst>
+              <a:ext uri="{FF2B5EF4-FFF2-40B4-BE49-F238E27FC236}">
+                <a16:creationId xmlns:a16="http://schemas.microsoft.com/office/drawing/2014/main" id="{7A7E5546-0C92-1456-1463-F80EFDADF62B}"/>
+              </a:ext>
+            </a:extLst>
+          </p:cNvPr>
+          <p:cNvPicPr>
+            <a:picLocks noChangeAspect="1"/>
+          </p:cNvPicPr>
+          <p:nvPr/>
+        </p:nvPicPr>
+        <p:blipFill>
+          <a:blip r:embed="rId2"/>
+          <a:stretch>
+            <a:fillRect/>
+          </a:stretch>
+        </p:blipFill>
+        <p:spPr>
+          <a:xfrm>
+            <a:off x="527192" y="0"/>
+            <a:ext cx="10718515" cy="6858000"/>
+          </a:xfrm>
+          <a:prstGeom prst="rect">
+            <a:avLst/>
+          </a:prstGeom>
+        </p:spPr>
+      </p:pic>
+    </p:spTree>
+    <p:extLst>
+      <p:ext uri="{BB962C8B-B14F-4D97-AF65-F5344CB8AC3E}">
+        <p14:creationId xmlns:p14="http://schemas.microsoft.com/office/powerpoint/2010/main" val="3118457127"/>
+      </p:ext>
+    </p:extLst>
+  </p:cSld>
+  <p:clrMapOvr>
+    <a:masterClrMapping/>
+  </p:clrMapOvr>
+</p:sld>
+</file>
+
+<file path=ppt/slides/slide16.xml><?xml version="1.0" encoding="utf-8"?>
+<p:sld xmlns:a="http://schemas.openxmlformats.org/drawingml/2006/main" xmlns:r="http://schemas.openxmlformats.org/officeDocument/2006/relationships" xmlns:p="http://schemas.openxmlformats.org/presentationml/2006/main">
+  <p:cSld>
+    <p:spTree>
+      <p:nvGrpSpPr>
+        <p:cNvPr id="1" name=""/>
+        <p:cNvGrpSpPr/>
+        <p:nvPr/>
+      </p:nvGrpSpPr>
+      <p:grpSpPr>
+        <a:xfrm>
+          <a:off x="0" y="0"/>
+          <a:ext cx="0" cy="0"/>
+          <a:chOff x="0" y="0"/>
+          <a:chExt cx="0" cy="0"/>
+        </a:xfrm>
+      </p:grpSpPr>
+      <p:pic>
+        <p:nvPicPr>
+          <p:cNvPr id="3" name="Picture 2">
+            <a:extLst>
+              <a:ext uri="{FF2B5EF4-FFF2-40B4-BE49-F238E27FC236}">
+                <a16:creationId xmlns:a16="http://schemas.microsoft.com/office/drawing/2014/main" id="{A40D87F4-E3BF-B4B2-0474-990AF1353FF5}"/>
+              </a:ext>
+            </a:extLst>
+          </p:cNvPr>
+          <p:cNvPicPr>
+            <a:picLocks noChangeAspect="1"/>
+          </p:cNvPicPr>
+          <p:nvPr/>
+        </p:nvPicPr>
+        <p:blipFill>
+          <a:blip r:embed="rId2"/>
+          <a:stretch>
+            <a:fillRect/>
+          </a:stretch>
+        </p:blipFill>
+        <p:spPr>
+          <a:xfrm>
+            <a:off x="775271" y="0"/>
+            <a:ext cx="10641458" cy="6858000"/>
+          </a:xfrm>
+          <a:prstGeom prst="rect">
+            <a:avLst/>
+          </a:prstGeom>
+        </p:spPr>
+      </p:pic>
+    </p:spTree>
+    <p:extLst>
+      <p:ext uri="{BB962C8B-B14F-4D97-AF65-F5344CB8AC3E}">
+        <p14:creationId xmlns:p14="http://schemas.microsoft.com/office/powerpoint/2010/main" val="3280935397"/>
+      </p:ext>
+    </p:extLst>
+  </p:cSld>
+  <p:clrMapOvr>
+    <a:masterClrMapping/>
+  </p:clrMapOvr>
+</p:sld>
+</file>
+
+<file path=ppt/slides/slide17.xml><?xml version="1.0" encoding="utf-8"?>
+<p:sld xmlns:a="http://schemas.openxmlformats.org/drawingml/2006/main" xmlns:r="http://schemas.openxmlformats.org/officeDocument/2006/relationships" xmlns:p="http://schemas.openxmlformats.org/presentationml/2006/main">
+  <p:cSld>
+    <p:spTree>
+      <p:nvGrpSpPr>
+        <p:cNvPr id="1" name=""/>
+        <p:cNvGrpSpPr/>
+        <p:nvPr/>
+      </p:nvGrpSpPr>
+      <p:grpSpPr>
+        <a:xfrm>
+          <a:off x="0" y="0"/>
+          <a:ext cx="0" cy="0"/>
+          <a:chOff x="0" y="0"/>
+          <a:chExt cx="0" cy="0"/>
+        </a:xfrm>
+      </p:grpSpPr>
+      <p:pic>
+        <p:nvPicPr>
+          <p:cNvPr id="3" name="Picture 2">
+            <a:extLst>
+              <a:ext uri="{FF2B5EF4-FFF2-40B4-BE49-F238E27FC236}">
+                <a16:creationId xmlns:a16="http://schemas.microsoft.com/office/drawing/2014/main" id="{93942119-9FE8-28B5-AFB6-C6A803AD0FD8}"/>
+              </a:ext>
+            </a:extLst>
+          </p:cNvPr>
+          <p:cNvPicPr>
+            <a:picLocks noChangeAspect="1"/>
+          </p:cNvPicPr>
+          <p:nvPr/>
+        </p:nvPicPr>
+        <p:blipFill>
+          <a:blip r:embed="rId2"/>
+          <a:stretch>
+            <a:fillRect/>
+          </a:stretch>
+        </p:blipFill>
+        <p:spPr>
+          <a:xfrm>
+            <a:off x="775271" y="161925"/>
+            <a:ext cx="10641458" cy="6858000"/>
+          </a:xfrm>
+          <a:prstGeom prst="rect">
+            <a:avLst/>
+          </a:prstGeom>
+        </p:spPr>
+      </p:pic>
+    </p:spTree>
+    <p:extLst>
+      <p:ext uri="{BB962C8B-B14F-4D97-AF65-F5344CB8AC3E}">
+        <p14:creationId xmlns:p14="http://schemas.microsoft.com/office/powerpoint/2010/main" val="2506909435"/>
+      </p:ext>
+    </p:extLst>
+  </p:cSld>
+  <p:clrMapOvr>
+    <a:masterClrMapping/>
+  </p:clrMapOvr>
+</p:sld>
+</file>
+
 <file path=ppt/slides/slide2.xml><?xml version="1.0" encoding="utf-8"?>
 <p:sld xmlns:a="http://schemas.openxmlformats.org/drawingml/2006/main" xmlns:r="http://schemas.openxmlformats.org/officeDocument/2006/relationships" xmlns:p="http://schemas.openxmlformats.org/presentationml/2006/main">
   <p:cSld>
@@ -3420,10 +4039,40 @@
           <a:chExt cx="0" cy="0"/>
         </a:xfrm>
       </p:grpSpPr>
+      <p:pic>
+        <p:nvPicPr>
+          <p:cNvPr id="12" name="Picture 11">
+            <a:extLst>
+              <a:ext uri="{FF2B5EF4-FFF2-40B4-BE49-F238E27FC236}">
+                <a16:creationId xmlns:a16="http://schemas.microsoft.com/office/drawing/2014/main" id="{3C48F063-FBCF-0086-5151-1DB6D51648F2}"/>
+              </a:ext>
+            </a:extLst>
+          </p:cNvPr>
+          <p:cNvPicPr>
+            <a:picLocks noChangeAspect="1"/>
+          </p:cNvPicPr>
+          <p:nvPr/>
+        </p:nvPicPr>
+        <p:blipFill>
+          <a:blip r:embed="rId2"/>
+          <a:stretch>
+            <a:fillRect/>
+          </a:stretch>
+        </p:blipFill>
+        <p:spPr>
+          <a:xfrm>
+            <a:off x="0" y="203510"/>
+            <a:ext cx="12192000" cy="6450979"/>
+          </a:xfrm>
+          <a:prstGeom prst="rect">
+            <a:avLst/>
+          </a:prstGeom>
+        </p:spPr>
+      </p:pic>
     </p:spTree>
     <p:extLst>
       <p:ext uri="{BB962C8B-B14F-4D97-AF65-F5344CB8AC3E}">
-        <p14:creationId xmlns:p14="http://schemas.microsoft.com/office/powerpoint/2010/main" val="886717011"/>
+        <p14:creationId xmlns:p14="http://schemas.microsoft.com/office/powerpoint/2010/main" val="2100408141"/>
       </p:ext>
     </p:extLst>
   </p:cSld>
@@ -3480,10 +4129,150 @@
           </a:prstGeom>
         </p:spPr>
       </p:pic>
+      <p:sp>
+        <p:nvSpPr>
+          <p:cNvPr id="2" name="Flowchart: Connector 1">
+            <a:extLst>
+              <a:ext uri="{FF2B5EF4-FFF2-40B4-BE49-F238E27FC236}">
+                <a16:creationId xmlns:a16="http://schemas.microsoft.com/office/drawing/2014/main" id="{EA945077-6C61-9331-6B2F-B5E58CF7F5A2}"/>
+              </a:ext>
+            </a:extLst>
+          </p:cNvPr>
+          <p:cNvSpPr/>
+          <p:nvPr/>
+        </p:nvSpPr>
+        <p:spPr>
+          <a:xfrm>
+            <a:off x="11277600" y="5459506"/>
+            <a:ext cx="824753" cy="833718"/>
+          </a:xfrm>
+          <a:prstGeom prst="flowChartConnector">
+            <a:avLst/>
+          </a:prstGeom>
+          <a:solidFill>
+            <a:schemeClr val="accent3">
+              <a:alpha val="50000"/>
+            </a:schemeClr>
+          </a:solidFill>
+          <a:ln>
+            <a:noFill/>
+          </a:ln>
+        </p:spPr>
+        <p:style>
+          <a:lnRef idx="0">
+            <a:scrgbClr r="0" g="0" b="0"/>
+          </a:lnRef>
+          <a:fillRef idx="0">
+            <a:scrgbClr r="0" g="0" b="0"/>
+          </a:fillRef>
+          <a:effectRef idx="0">
+            <a:scrgbClr r="0" g="0" b="0"/>
+          </a:effectRef>
+          <a:fontRef idx="minor">
+            <a:schemeClr val="lt1"/>
+          </a:fontRef>
+        </p:style>
+        <p:txBody>
+          <a:bodyPr rtlCol="0" anchor="ctr"/>
+          <a:lstStyle/>
+          <a:p>
+            <a:pPr algn="ctr"/>
+            <a:endParaRPr lang="en-GB"/>
+          </a:p>
+        </p:txBody>
+      </p:sp>
+      <p:cxnSp>
+        <p:nvCxnSpPr>
+          <p:cNvPr id="4" name="Straight Arrow Connector 3">
+            <a:extLst>
+              <a:ext uri="{FF2B5EF4-FFF2-40B4-BE49-F238E27FC236}">
+                <a16:creationId xmlns:a16="http://schemas.microsoft.com/office/drawing/2014/main" id="{8D441FBD-BAC5-1656-E489-F4C2E3724B38}"/>
+              </a:ext>
+            </a:extLst>
+          </p:cNvPr>
+          <p:cNvCxnSpPr>
+            <a:cxnSpLocks/>
+          </p:cNvCxnSpPr>
+          <p:nvPr/>
+        </p:nvCxnSpPr>
+        <p:spPr>
+          <a:xfrm flipH="1" flipV="1">
+            <a:off x="10865224" y="3630706"/>
+            <a:ext cx="954741" cy="2108044"/>
+          </a:xfrm>
+          <a:prstGeom prst="straightConnector1">
+            <a:avLst/>
+          </a:prstGeom>
+          <a:ln>
+            <a:tailEnd type="triangle"/>
+          </a:ln>
+        </p:spPr>
+        <p:style>
+          <a:lnRef idx="2">
+            <a:schemeClr val="dk1"/>
+          </a:lnRef>
+          <a:fillRef idx="0">
+            <a:schemeClr val="dk1"/>
+          </a:fillRef>
+          <a:effectRef idx="1">
+            <a:schemeClr val="dk1"/>
+          </a:effectRef>
+          <a:fontRef idx="minor">
+            <a:schemeClr val="tx1"/>
+          </a:fontRef>
+        </p:style>
+      </p:cxnSp>
+      <p:pic>
+        <p:nvPicPr>
+          <p:cNvPr id="1026" name="Picture 2">
+            <a:extLst>
+              <a:ext uri="{FF2B5EF4-FFF2-40B4-BE49-F238E27FC236}">
+                <a16:creationId xmlns:a16="http://schemas.microsoft.com/office/drawing/2014/main" id="{391DFFAC-BD71-6124-6A8F-17ACC77D6A85}"/>
+              </a:ext>
+            </a:extLst>
+          </p:cNvPr>
+          <p:cNvPicPr>
+            <a:picLocks noChangeAspect="1" noChangeArrowheads="1"/>
+          </p:cNvPicPr>
+          <p:nvPr/>
+        </p:nvPicPr>
+        <p:blipFill>
+          <a:blip r:embed="rId3">
+            <a:extLst>
+              <a:ext uri="{28A0092B-C50C-407E-A947-70E740481C1C}">
+                <a14:useLocalDpi xmlns:a14="http://schemas.microsoft.com/office/drawing/2010/main" val="0"/>
+              </a:ext>
+            </a:extLst>
+          </a:blip>
+          <a:srcRect/>
+          <a:stretch>
+            <a:fillRect/>
+          </a:stretch>
+        </p:blipFill>
+        <p:spPr bwMode="auto">
+          <a:xfrm>
+            <a:off x="8190380" y="1741116"/>
+            <a:ext cx="3562349" cy="1795462"/>
+          </a:xfrm>
+          <a:prstGeom prst="rect">
+            <a:avLst/>
+          </a:prstGeom>
+          <a:noFill/>
+          <a:extLst>
+            <a:ext uri="{909E8E84-426E-40DD-AFC4-6F175D3DCCD1}">
+              <a14:hiddenFill xmlns:a14="http://schemas.microsoft.com/office/drawing/2010/main">
+                <a:solidFill>
+                  <a:srgbClr val="FFFFFF"/>
+                </a:solidFill>
+              </a14:hiddenFill>
+            </a:ext>
+          </a:extLst>
+        </p:spPr>
+      </p:pic>
     </p:spTree>
     <p:extLst>
       <p:ext uri="{BB962C8B-B14F-4D97-AF65-F5344CB8AC3E}">
-        <p14:creationId xmlns:p14="http://schemas.microsoft.com/office/powerpoint/2010/main" val="2100408141"/>
+        <p14:creationId xmlns:p14="http://schemas.microsoft.com/office/powerpoint/2010/main" val="3165031122"/>
       </p:ext>
     </p:extLst>
   </p:cSld>
@@ -3512,10 +4301,10 @@
       </p:grpSpPr>
       <p:pic>
         <p:nvPicPr>
-          <p:cNvPr id="12" name="Picture 11">
-            <a:extLst>
-              <a:ext uri="{FF2B5EF4-FFF2-40B4-BE49-F238E27FC236}">
-                <a16:creationId xmlns:a16="http://schemas.microsoft.com/office/drawing/2014/main" id="{3C48F063-FBCF-0086-5151-1DB6D51648F2}"/>
+          <p:cNvPr id="3" name="Picture 2">
+            <a:extLst>
+              <a:ext uri="{FF2B5EF4-FFF2-40B4-BE49-F238E27FC236}">
+                <a16:creationId xmlns:a16="http://schemas.microsoft.com/office/drawing/2014/main" id="{7D2A94BB-C6D7-BA0C-8A7F-E30341BD3E03}"/>
               </a:ext>
             </a:extLst>
           </p:cNvPr>
@@ -3532,158 +4321,18 @@
         </p:blipFill>
         <p:spPr>
           <a:xfrm>
-            <a:off x="0" y="203510"/>
-            <a:ext cx="12192000" cy="6450979"/>
+            <a:off x="0" y="173081"/>
+            <a:ext cx="12192000" cy="6511837"/>
           </a:xfrm>
           <a:prstGeom prst="rect">
             <a:avLst/>
           </a:prstGeom>
-        </p:spPr>
-      </p:pic>
-      <p:sp>
-        <p:nvSpPr>
-          <p:cNvPr id="2" name="Flowchart: Connector 1">
-            <a:extLst>
-              <a:ext uri="{FF2B5EF4-FFF2-40B4-BE49-F238E27FC236}">
-                <a16:creationId xmlns:a16="http://schemas.microsoft.com/office/drawing/2014/main" id="{EA945077-6C61-9331-6B2F-B5E58CF7F5A2}"/>
-              </a:ext>
-            </a:extLst>
-          </p:cNvPr>
-          <p:cNvSpPr/>
-          <p:nvPr/>
-        </p:nvSpPr>
-        <p:spPr>
-          <a:xfrm>
-            <a:off x="11277600" y="5459506"/>
-            <a:ext cx="824753" cy="833718"/>
-          </a:xfrm>
-          <a:prstGeom prst="flowChartConnector">
-            <a:avLst/>
-          </a:prstGeom>
-          <a:solidFill>
-            <a:schemeClr val="accent3">
-              <a:alpha val="50000"/>
-            </a:schemeClr>
-          </a:solidFill>
-          <a:ln>
-            <a:noFill/>
-          </a:ln>
-        </p:spPr>
-        <p:style>
-          <a:lnRef idx="0">
-            <a:scrgbClr r="0" g="0" b="0"/>
-          </a:lnRef>
-          <a:fillRef idx="0">
-            <a:scrgbClr r="0" g="0" b="0"/>
-          </a:fillRef>
-          <a:effectRef idx="0">
-            <a:scrgbClr r="0" g="0" b="0"/>
-          </a:effectRef>
-          <a:fontRef idx="minor">
-            <a:schemeClr val="lt1"/>
-          </a:fontRef>
-        </p:style>
-        <p:txBody>
-          <a:bodyPr rtlCol="0" anchor="ctr"/>
-          <a:lstStyle/>
-          <a:p>
-            <a:pPr algn="ctr"/>
-            <a:endParaRPr lang="en-GB"/>
-          </a:p>
-        </p:txBody>
-      </p:sp>
-      <p:cxnSp>
-        <p:nvCxnSpPr>
-          <p:cNvPr id="4" name="Straight Arrow Connector 3">
-            <a:extLst>
-              <a:ext uri="{FF2B5EF4-FFF2-40B4-BE49-F238E27FC236}">
-                <a16:creationId xmlns:a16="http://schemas.microsoft.com/office/drawing/2014/main" id="{8D441FBD-BAC5-1656-E489-F4C2E3724B38}"/>
-              </a:ext>
-            </a:extLst>
-          </p:cNvPr>
-          <p:cNvCxnSpPr>
-            <a:cxnSpLocks/>
-          </p:cNvCxnSpPr>
-          <p:nvPr/>
-        </p:nvCxnSpPr>
-        <p:spPr>
-          <a:xfrm flipH="1" flipV="1">
-            <a:off x="10865224" y="3630706"/>
-            <a:ext cx="954741" cy="2108044"/>
-          </a:xfrm>
-          <a:prstGeom prst="straightConnector1">
-            <a:avLst/>
-          </a:prstGeom>
-          <a:ln>
-            <a:tailEnd type="triangle"/>
-          </a:ln>
-        </p:spPr>
-        <p:style>
-          <a:lnRef idx="2">
-            <a:schemeClr val="dk1"/>
-          </a:lnRef>
-          <a:fillRef idx="0">
-            <a:schemeClr val="dk1"/>
-          </a:fillRef>
-          <a:effectRef idx="1">
-            <a:schemeClr val="dk1"/>
-          </a:effectRef>
-          <a:fontRef idx="minor">
-            <a:schemeClr val="tx1"/>
-          </a:fontRef>
-        </p:style>
-      </p:cxnSp>
-      <p:pic>
-        <p:nvPicPr>
-          <p:cNvPr id="1026" name="Picture 2">
-            <a:extLst>
-              <a:ext uri="{FF2B5EF4-FFF2-40B4-BE49-F238E27FC236}">
-                <a16:creationId xmlns:a16="http://schemas.microsoft.com/office/drawing/2014/main" id="{391DFFAC-BD71-6124-6A8F-17ACC77D6A85}"/>
-              </a:ext>
-            </a:extLst>
-          </p:cNvPr>
-          <p:cNvPicPr>
-            <a:picLocks noChangeAspect="1" noChangeArrowheads="1"/>
-          </p:cNvPicPr>
-          <p:nvPr/>
-        </p:nvPicPr>
-        <p:blipFill>
-          <a:blip r:embed="rId3">
-            <a:extLst>
-              <a:ext uri="{28A0092B-C50C-407E-A947-70E740481C1C}">
-                <a14:useLocalDpi xmlns:a14="http://schemas.microsoft.com/office/drawing/2010/main" val="0"/>
-              </a:ext>
-            </a:extLst>
-          </a:blip>
-          <a:srcRect/>
-          <a:stretch>
-            <a:fillRect/>
-          </a:stretch>
-        </p:blipFill>
-        <p:spPr bwMode="auto">
-          <a:xfrm>
-            <a:off x="8190380" y="1741116"/>
-            <a:ext cx="3562349" cy="1795462"/>
-          </a:xfrm>
-          <a:prstGeom prst="rect">
-            <a:avLst/>
-          </a:prstGeom>
-          <a:noFill/>
-          <a:extLst>
-            <a:ext uri="{909E8E84-426E-40DD-AFC4-6F175D3DCCD1}">
-              <a14:hiddenFill xmlns:a14="http://schemas.microsoft.com/office/drawing/2010/main">
-                <a:solidFill>
-                  <a:srgbClr val="FFFFFF"/>
-                </a:solidFill>
-              </a14:hiddenFill>
-            </a:ext>
-          </a:extLst>
         </p:spPr>
       </p:pic>
     </p:spTree>
     <p:extLst>
       <p:ext uri="{BB962C8B-B14F-4D97-AF65-F5344CB8AC3E}">
-        <p14:creationId xmlns:p14="http://schemas.microsoft.com/office/powerpoint/2010/main" val="3165031122"/>
+        <p14:creationId xmlns:p14="http://schemas.microsoft.com/office/powerpoint/2010/main" val="1159066372"/>
       </p:ext>
     </p:extLst>
   </p:cSld>
@@ -3715,7 +4364,7 @@
           <p:cNvPr id="3" name="Picture 2">
             <a:extLst>
               <a:ext uri="{FF2B5EF4-FFF2-40B4-BE49-F238E27FC236}">
-                <a16:creationId xmlns:a16="http://schemas.microsoft.com/office/drawing/2014/main" id="{7D2A94BB-C6D7-BA0C-8A7F-E30341BD3E03}"/>
+                <a16:creationId xmlns:a16="http://schemas.microsoft.com/office/drawing/2014/main" id="{E2FDF45A-874F-EFEF-0F15-4B3907DEAB70}"/>
               </a:ext>
             </a:extLst>
           </p:cNvPr>
@@ -3731,19 +4380,733 @@
           </a:stretch>
         </p:blipFill>
         <p:spPr>
-          <a:xfrm>
-            <a:off x="0" y="173081"/>
-            <a:ext cx="12192000" cy="6511837"/>
+          <a:xfrm rot="18980188">
+            <a:off x="1040731" y="2292985"/>
+            <a:ext cx="2912578" cy="2850709"/>
           </a:xfrm>
           <a:prstGeom prst="rect">
             <a:avLst/>
           </a:prstGeom>
         </p:spPr>
       </p:pic>
+      <p:cxnSp>
+        <p:nvCxnSpPr>
+          <p:cNvPr id="5" name="Straight Arrow Connector 4">
+            <a:extLst>
+              <a:ext uri="{FF2B5EF4-FFF2-40B4-BE49-F238E27FC236}">
+                <a16:creationId xmlns:a16="http://schemas.microsoft.com/office/drawing/2014/main" id="{D70ED7BC-242A-5A5A-7A71-1E5452F491AC}"/>
+              </a:ext>
+            </a:extLst>
+          </p:cNvPr>
+          <p:cNvCxnSpPr>
+            <a:cxnSpLocks/>
+          </p:cNvCxnSpPr>
+          <p:nvPr/>
+        </p:nvCxnSpPr>
+        <p:spPr>
+          <a:xfrm flipV="1">
+            <a:off x="583974" y="1833999"/>
+            <a:ext cx="1778393" cy="1612685"/>
+          </a:xfrm>
+          <a:prstGeom prst="straightConnector1">
+            <a:avLst/>
+          </a:prstGeom>
+          <a:ln>
+            <a:tailEnd type="triangle"/>
+          </a:ln>
+        </p:spPr>
+        <p:style>
+          <a:lnRef idx="2">
+            <a:schemeClr val="accent1"/>
+          </a:lnRef>
+          <a:fillRef idx="0">
+            <a:schemeClr val="accent1"/>
+          </a:fillRef>
+          <a:effectRef idx="1">
+            <a:schemeClr val="accent1"/>
+          </a:effectRef>
+          <a:fontRef idx="minor">
+            <a:schemeClr val="tx1"/>
+          </a:fontRef>
+        </p:style>
+      </p:cxnSp>
+      <p:sp>
+        <p:nvSpPr>
+          <p:cNvPr id="6" name="TextBox 5">
+            <a:extLst>
+              <a:ext uri="{FF2B5EF4-FFF2-40B4-BE49-F238E27FC236}">
+                <a16:creationId xmlns:a16="http://schemas.microsoft.com/office/drawing/2014/main" id="{B8D3EF38-0950-5E22-1CBB-F74571011702}"/>
+              </a:ext>
+            </a:extLst>
+          </p:cNvPr>
+          <p:cNvSpPr txBox="1"/>
+          <p:nvPr/>
+        </p:nvSpPr>
+        <p:spPr>
+          <a:xfrm>
+            <a:off x="252153" y="2107707"/>
+            <a:ext cx="1471044" cy="369332"/>
+          </a:xfrm>
+          <a:prstGeom prst="rect">
+            <a:avLst/>
+          </a:prstGeom>
+          <a:noFill/>
+        </p:spPr>
+        <p:txBody>
+          <a:bodyPr wrap="none" rtlCol="0">
+            <a:spAutoFit/>
+          </a:bodyPr>
+          <a:lstStyle/>
+          <a:p>
+            <a:r>
+              <a:rPr lang="en-GB" dirty="0"/>
+              <a:t>Eta Direction</a:t>
+            </a:r>
+          </a:p>
+        </p:txBody>
+      </p:sp>
+      <p:sp>
+        <p:nvSpPr>
+          <p:cNvPr id="10" name="Flowchart: Connector 9">
+            <a:extLst>
+              <a:ext uri="{FF2B5EF4-FFF2-40B4-BE49-F238E27FC236}">
+                <a16:creationId xmlns:a16="http://schemas.microsoft.com/office/drawing/2014/main" id="{8E6DDC60-28F8-3362-4A27-34E1B8C3BB37}"/>
+              </a:ext>
+            </a:extLst>
+          </p:cNvPr>
+          <p:cNvSpPr/>
+          <p:nvPr/>
+        </p:nvSpPr>
+        <p:spPr>
+          <a:xfrm>
+            <a:off x="1874096" y="5207779"/>
+            <a:ext cx="204186" cy="213064"/>
+          </a:xfrm>
+          <a:prstGeom prst="flowChartConnector">
+            <a:avLst/>
+          </a:prstGeom>
+        </p:spPr>
+        <p:style>
+          <a:lnRef idx="2">
+            <a:schemeClr val="dk1">
+              <a:shade val="15000"/>
+            </a:schemeClr>
+          </a:lnRef>
+          <a:fillRef idx="1">
+            <a:schemeClr val="dk1"/>
+          </a:fillRef>
+          <a:effectRef idx="0">
+            <a:schemeClr val="dk1"/>
+          </a:effectRef>
+          <a:fontRef idx="minor">
+            <a:schemeClr val="lt1"/>
+          </a:fontRef>
+        </p:style>
+        <p:txBody>
+          <a:bodyPr rtlCol="0" anchor="ctr"/>
+          <a:lstStyle/>
+          <a:p>
+            <a:pPr algn="ctr"/>
+            <a:endParaRPr lang="en-GB"/>
+          </a:p>
+        </p:txBody>
+      </p:sp>
+      <p:sp>
+        <p:nvSpPr>
+          <p:cNvPr id="11" name="TextBox 10">
+            <a:extLst>
+              <a:ext uri="{FF2B5EF4-FFF2-40B4-BE49-F238E27FC236}">
+                <a16:creationId xmlns:a16="http://schemas.microsoft.com/office/drawing/2014/main" id="{3346D8F7-B829-EC7A-5BB1-AFAF6E2487B5}"/>
+              </a:ext>
+            </a:extLst>
+          </p:cNvPr>
+          <p:cNvSpPr txBox="1"/>
+          <p:nvPr/>
+        </p:nvSpPr>
+        <p:spPr>
+          <a:xfrm>
+            <a:off x="1173218" y="5431739"/>
+            <a:ext cx="1162975" cy="646331"/>
+          </a:xfrm>
+          <a:prstGeom prst="rect">
+            <a:avLst/>
+          </a:prstGeom>
+          <a:noFill/>
+        </p:spPr>
+        <p:txBody>
+          <a:bodyPr wrap="square" rtlCol="0">
+            <a:spAutoFit/>
+          </a:bodyPr>
+          <a:lstStyle/>
+          <a:p>
+            <a:r>
+              <a:rPr lang="en-GB" dirty="0"/>
+              <a:t>Phi Direction</a:t>
+            </a:r>
+          </a:p>
+        </p:txBody>
+      </p:sp>
+      <p:cxnSp>
+        <p:nvCxnSpPr>
+          <p:cNvPr id="13" name="Straight Arrow Connector 12">
+            <a:extLst>
+              <a:ext uri="{FF2B5EF4-FFF2-40B4-BE49-F238E27FC236}">
+                <a16:creationId xmlns:a16="http://schemas.microsoft.com/office/drawing/2014/main" id="{15341FFD-D74F-E200-6019-AC261946D22B}"/>
+              </a:ext>
+            </a:extLst>
+          </p:cNvPr>
+          <p:cNvCxnSpPr/>
+          <p:nvPr/>
+        </p:nvCxnSpPr>
+        <p:spPr>
+          <a:xfrm flipH="1" flipV="1">
+            <a:off x="1928919" y="2943973"/>
+            <a:ext cx="1435068" cy="1633491"/>
+          </a:xfrm>
+          <a:prstGeom prst="straightConnector1">
+            <a:avLst/>
+          </a:prstGeom>
+          <a:ln w="57150">
+            <a:tailEnd type="triangle"/>
+          </a:ln>
+        </p:spPr>
+        <p:style>
+          <a:lnRef idx="2">
+            <a:schemeClr val="dk1"/>
+          </a:lnRef>
+          <a:fillRef idx="0">
+            <a:schemeClr val="dk1"/>
+          </a:fillRef>
+          <a:effectRef idx="1">
+            <a:schemeClr val="dk1"/>
+          </a:effectRef>
+          <a:fontRef idx="minor">
+            <a:schemeClr val="tx1"/>
+          </a:fontRef>
+        </p:style>
+      </p:cxnSp>
+      <p:sp>
+        <p:nvSpPr>
+          <p:cNvPr id="16" name="Partial Circle 15">
+            <a:extLst>
+              <a:ext uri="{FF2B5EF4-FFF2-40B4-BE49-F238E27FC236}">
+                <a16:creationId xmlns:a16="http://schemas.microsoft.com/office/drawing/2014/main" id="{ED44CD69-685C-BCC9-9F2C-AFB10F140288}"/>
+              </a:ext>
+            </a:extLst>
+          </p:cNvPr>
+          <p:cNvSpPr/>
+          <p:nvPr/>
+        </p:nvSpPr>
+        <p:spPr>
+          <a:xfrm>
+            <a:off x="923267" y="4202706"/>
+            <a:ext cx="3027286" cy="2565647"/>
+          </a:xfrm>
+          <a:prstGeom prst="pie">
+            <a:avLst>
+              <a:gd name="adj1" fmla="val 18995286"/>
+              <a:gd name="adj2" fmla="val 75336"/>
+            </a:avLst>
+          </a:prstGeom>
+          <a:solidFill>
+            <a:schemeClr val="accent4">
+              <a:alpha val="50000"/>
+            </a:schemeClr>
+          </a:solidFill>
+          <a:ln>
+            <a:noFill/>
+          </a:ln>
+        </p:spPr>
+        <p:style>
+          <a:lnRef idx="0">
+            <a:scrgbClr r="0" g="0" b="0"/>
+          </a:lnRef>
+          <a:fillRef idx="0">
+            <a:scrgbClr r="0" g="0" b="0"/>
+          </a:fillRef>
+          <a:effectRef idx="0">
+            <a:scrgbClr r="0" g="0" b="0"/>
+          </a:effectRef>
+          <a:fontRef idx="minor">
+            <a:schemeClr val="lt1"/>
+          </a:fontRef>
+        </p:style>
+        <p:txBody>
+          <a:bodyPr rtlCol="0" anchor="ctr"/>
+          <a:lstStyle/>
+          <a:p>
+            <a:pPr algn="ctr"/>
+            <a:endParaRPr lang="en-GB">
+              <a:solidFill>
+                <a:schemeClr val="tx1"/>
+              </a:solidFill>
+            </a:endParaRPr>
+          </a:p>
+        </p:txBody>
+      </p:sp>
+      <p:sp>
+        <p:nvSpPr>
+          <p:cNvPr id="17" name="TextBox 16">
+            <a:extLst>
+              <a:ext uri="{FF2B5EF4-FFF2-40B4-BE49-F238E27FC236}">
+                <a16:creationId xmlns:a16="http://schemas.microsoft.com/office/drawing/2014/main" id="{6FA9354A-03CC-A3CC-E8C6-668588625393}"/>
+              </a:ext>
+            </a:extLst>
+          </p:cNvPr>
+          <p:cNvSpPr txBox="1"/>
+          <p:nvPr/>
+        </p:nvSpPr>
+        <p:spPr>
+          <a:xfrm>
+            <a:off x="2779524" y="5031220"/>
+            <a:ext cx="871459" cy="378565"/>
+          </a:xfrm>
+          <a:prstGeom prst="rect">
+            <a:avLst/>
+          </a:prstGeom>
+          <a:noFill/>
+        </p:spPr>
+        <p:txBody>
+          <a:bodyPr wrap="square" rtlCol="0">
+            <a:spAutoFit/>
+          </a:bodyPr>
+          <a:lstStyle/>
+          <a:p>
+            <a:pPr>
+              <a:lnSpc>
+                <a:spcPct val="107000"/>
+              </a:lnSpc>
+              <a:spcAft>
+                <a:spcPts val="800"/>
+              </a:spcAft>
+            </a:pPr>
+            <a:r>
+              <a:rPr lang="en-GB" sz="1800" kern="100" dirty="0">
+                <a:effectLst/>
+                <a:latin typeface="Aptos" panose="020B0004020202020204" pitchFamily="34" charset="0"/>
+                <a:ea typeface="Aptos" panose="020B0004020202020204" pitchFamily="34" charset="0"/>
+                <a:cs typeface="Times New Roman" panose="02020603050405020304" pitchFamily="18" charset="0"/>
+              </a:rPr>
+              <a:t>45</a:t>
+            </a:r>
+            <a:r>
+              <a:rPr lang="en-GB" sz="1800" kern="100" baseline="30000" dirty="0">
+                <a:effectLst/>
+                <a:latin typeface="Aptos" panose="020B0004020202020204" pitchFamily="34" charset="0"/>
+                <a:ea typeface="Aptos" panose="020B0004020202020204" pitchFamily="34" charset="0"/>
+                <a:cs typeface="Times New Roman" panose="02020603050405020304" pitchFamily="18" charset="0"/>
+              </a:rPr>
+              <a:t>0</a:t>
+            </a:r>
+            <a:endParaRPr lang="en-GB" sz="1800" kern="100" dirty="0">
+              <a:effectLst/>
+              <a:latin typeface="Aptos" panose="020B0004020202020204" pitchFamily="34" charset="0"/>
+              <a:ea typeface="Aptos" panose="020B0004020202020204" pitchFamily="34" charset="0"/>
+              <a:cs typeface="Times New Roman" panose="02020603050405020304" pitchFamily="18" charset="0"/>
+            </a:endParaRPr>
+          </a:p>
+        </p:txBody>
+      </p:sp>
+      <p:sp>
+        <p:nvSpPr>
+          <p:cNvPr id="19" name="TextBox 18">
+            <a:extLst>
+              <a:ext uri="{FF2B5EF4-FFF2-40B4-BE49-F238E27FC236}">
+                <a16:creationId xmlns:a16="http://schemas.microsoft.com/office/drawing/2014/main" id="{42AA3CD3-71C3-29A7-0CC5-7AF97FCF5EC1}"/>
+              </a:ext>
+            </a:extLst>
+          </p:cNvPr>
+          <p:cNvSpPr txBox="1"/>
+          <p:nvPr/>
+        </p:nvSpPr>
+        <p:spPr>
+          <a:xfrm>
+            <a:off x="2815148" y="3559667"/>
+            <a:ext cx="871459" cy="378565"/>
+          </a:xfrm>
+          <a:prstGeom prst="rect">
+            <a:avLst/>
+          </a:prstGeom>
+          <a:noFill/>
+        </p:spPr>
+        <p:txBody>
+          <a:bodyPr wrap="square" rtlCol="0">
+            <a:spAutoFit/>
+          </a:bodyPr>
+          <a:lstStyle/>
+          <a:p>
+            <a:pPr>
+              <a:lnSpc>
+                <a:spcPct val="107000"/>
+              </a:lnSpc>
+              <a:spcAft>
+                <a:spcPts val="800"/>
+              </a:spcAft>
+            </a:pPr>
+            <a:r>
+              <a:rPr lang="en-GB" sz="1800" kern="100" dirty="0">
+                <a:effectLst/>
+                <a:latin typeface="Aptos" panose="020B0004020202020204" pitchFamily="34" charset="0"/>
+                <a:ea typeface="Aptos" panose="020B0004020202020204" pitchFamily="34" charset="0"/>
+                <a:cs typeface="Times New Roman" panose="02020603050405020304" pitchFamily="18" charset="0"/>
+              </a:rPr>
+              <a:t>50</a:t>
+            </a:r>
+            <a:r>
+              <a:rPr lang="en-GB" sz="1800" kern="100" baseline="30000" dirty="0">
+                <a:effectLst/>
+                <a:latin typeface="Aptos" panose="020B0004020202020204" pitchFamily="34" charset="0"/>
+                <a:ea typeface="Aptos" panose="020B0004020202020204" pitchFamily="34" charset="0"/>
+                <a:cs typeface="Times New Roman" panose="02020603050405020304" pitchFamily="18" charset="0"/>
+              </a:rPr>
+              <a:t>0</a:t>
+            </a:r>
+            <a:endParaRPr lang="en-GB" sz="1800" kern="100" dirty="0">
+              <a:effectLst/>
+              <a:latin typeface="Aptos" panose="020B0004020202020204" pitchFamily="34" charset="0"/>
+              <a:ea typeface="Aptos" panose="020B0004020202020204" pitchFamily="34" charset="0"/>
+              <a:cs typeface="Times New Roman" panose="02020603050405020304" pitchFamily="18" charset="0"/>
+            </a:endParaRPr>
+          </a:p>
+        </p:txBody>
+      </p:sp>
+      <p:cxnSp>
+        <p:nvCxnSpPr>
+          <p:cNvPr id="20" name="Straight Arrow Connector 19">
+            <a:extLst>
+              <a:ext uri="{FF2B5EF4-FFF2-40B4-BE49-F238E27FC236}">
+                <a16:creationId xmlns:a16="http://schemas.microsoft.com/office/drawing/2014/main" id="{6E06FC1B-FB6E-827B-DD46-1603302E3920}"/>
+              </a:ext>
+            </a:extLst>
+          </p:cNvPr>
+          <p:cNvCxnSpPr>
+            <a:cxnSpLocks/>
+          </p:cNvCxnSpPr>
+          <p:nvPr/>
+        </p:nvCxnSpPr>
+        <p:spPr>
+          <a:xfrm flipH="1" flipV="1">
+            <a:off x="3331575" y="914916"/>
+            <a:ext cx="24762" cy="4592977"/>
+          </a:xfrm>
+          <a:prstGeom prst="straightConnector1">
+            <a:avLst/>
+          </a:prstGeom>
+          <a:ln w="57150">
+            <a:tailEnd type="triangle"/>
+          </a:ln>
+        </p:spPr>
+        <p:style>
+          <a:lnRef idx="2">
+            <a:schemeClr val="dk1"/>
+          </a:lnRef>
+          <a:fillRef idx="0">
+            <a:schemeClr val="dk1"/>
+          </a:fillRef>
+          <a:effectRef idx="1">
+            <a:schemeClr val="dk1"/>
+          </a:effectRef>
+          <a:fontRef idx="minor">
+            <a:schemeClr val="tx1"/>
+          </a:fontRef>
+        </p:style>
+      </p:cxnSp>
+      <p:sp>
+        <p:nvSpPr>
+          <p:cNvPr id="24" name="Partial Circle 23">
+            <a:extLst>
+              <a:ext uri="{FF2B5EF4-FFF2-40B4-BE49-F238E27FC236}">
+                <a16:creationId xmlns:a16="http://schemas.microsoft.com/office/drawing/2014/main" id="{D7EB1C07-290C-2CA0-0BAE-925D297AEBAC}"/>
+              </a:ext>
+            </a:extLst>
+          </p:cNvPr>
+          <p:cNvSpPr/>
+          <p:nvPr/>
+        </p:nvSpPr>
+        <p:spPr>
+          <a:xfrm rot="17686702">
+            <a:off x="1770871" y="3034295"/>
+            <a:ext cx="3146171" cy="2988639"/>
+          </a:xfrm>
+          <a:prstGeom prst="pie">
+            <a:avLst>
+              <a:gd name="adj1" fmla="val 20169912"/>
+              <a:gd name="adj2" fmla="val 20959479"/>
+            </a:avLst>
+          </a:prstGeom>
+          <a:solidFill>
+            <a:schemeClr val="accent5">
+              <a:alpha val="50000"/>
+            </a:schemeClr>
+          </a:solidFill>
+          <a:ln>
+            <a:noFill/>
+          </a:ln>
+        </p:spPr>
+        <p:style>
+          <a:lnRef idx="0">
+            <a:scrgbClr r="0" g="0" b="0"/>
+          </a:lnRef>
+          <a:fillRef idx="0">
+            <a:scrgbClr r="0" g="0" b="0"/>
+          </a:fillRef>
+          <a:effectRef idx="0">
+            <a:scrgbClr r="0" g="0" b="0"/>
+          </a:effectRef>
+          <a:fontRef idx="minor">
+            <a:schemeClr val="lt1"/>
+          </a:fontRef>
+        </p:style>
+        <p:txBody>
+          <a:bodyPr rtlCol="0" anchor="ctr"/>
+          <a:lstStyle/>
+          <a:p>
+            <a:pPr algn="ctr"/>
+            <a:endParaRPr lang="en-GB">
+              <a:solidFill>
+                <a:schemeClr val="tx1"/>
+              </a:solidFill>
+            </a:endParaRPr>
+          </a:p>
+        </p:txBody>
+      </p:sp>
+      <p:sp>
+        <p:nvSpPr>
+          <p:cNvPr id="18" name="Partial Circle 17">
+            <a:extLst>
+              <a:ext uri="{FF2B5EF4-FFF2-40B4-BE49-F238E27FC236}">
+                <a16:creationId xmlns:a16="http://schemas.microsoft.com/office/drawing/2014/main" id="{DBA34E40-956C-CAC8-887E-246E91CB6B92}"/>
+              </a:ext>
+            </a:extLst>
+          </p:cNvPr>
+          <p:cNvSpPr/>
+          <p:nvPr/>
+        </p:nvSpPr>
+        <p:spPr>
+          <a:xfrm rot="17686702">
+            <a:off x="1979055" y="3372578"/>
+            <a:ext cx="2729801" cy="2312074"/>
+          </a:xfrm>
+          <a:prstGeom prst="pie">
+            <a:avLst>
+              <a:gd name="adj1" fmla="val 17664541"/>
+              <a:gd name="adj2" fmla="val 20962643"/>
+            </a:avLst>
+          </a:prstGeom>
+          <a:solidFill>
+            <a:schemeClr val="accent6">
+              <a:alpha val="50000"/>
+            </a:schemeClr>
+          </a:solidFill>
+          <a:ln>
+            <a:noFill/>
+          </a:ln>
+        </p:spPr>
+        <p:style>
+          <a:lnRef idx="0">
+            <a:scrgbClr r="0" g="0" b="0"/>
+          </a:lnRef>
+          <a:fillRef idx="0">
+            <a:scrgbClr r="0" g="0" b="0"/>
+          </a:fillRef>
+          <a:effectRef idx="0">
+            <a:scrgbClr r="0" g="0" b="0"/>
+          </a:effectRef>
+          <a:fontRef idx="minor">
+            <a:schemeClr val="lt1"/>
+          </a:fontRef>
+        </p:style>
+        <p:txBody>
+          <a:bodyPr rtlCol="0" anchor="ctr"/>
+          <a:lstStyle/>
+          <a:p>
+            <a:pPr algn="ctr"/>
+            <a:endParaRPr lang="en-GB" dirty="0">
+              <a:solidFill>
+                <a:schemeClr val="tx1"/>
+              </a:solidFill>
+            </a:endParaRPr>
+          </a:p>
+        </p:txBody>
+      </p:sp>
+      <p:sp>
+        <p:nvSpPr>
+          <p:cNvPr id="25" name="TextBox 24">
+            <a:extLst>
+              <a:ext uri="{FF2B5EF4-FFF2-40B4-BE49-F238E27FC236}">
+                <a16:creationId xmlns:a16="http://schemas.microsoft.com/office/drawing/2014/main" id="{0FFB31CC-C20A-4E52-A562-3224278F277F}"/>
+              </a:ext>
+            </a:extLst>
+          </p:cNvPr>
+          <p:cNvSpPr txBox="1"/>
+          <p:nvPr/>
+        </p:nvSpPr>
+        <p:spPr>
+          <a:xfrm>
+            <a:off x="3421968" y="2826421"/>
+            <a:ext cx="871459" cy="378565"/>
+          </a:xfrm>
+          <a:prstGeom prst="rect">
+            <a:avLst/>
+          </a:prstGeom>
+          <a:noFill/>
+        </p:spPr>
+        <p:txBody>
+          <a:bodyPr wrap="square" rtlCol="0">
+            <a:spAutoFit/>
+          </a:bodyPr>
+          <a:lstStyle/>
+          <a:p>
+            <a:pPr>
+              <a:lnSpc>
+                <a:spcPct val="107000"/>
+              </a:lnSpc>
+              <a:spcAft>
+                <a:spcPts val="800"/>
+              </a:spcAft>
+            </a:pPr>
+            <a:r>
+              <a:rPr lang="en-GB" sz="1800" kern="100" dirty="0">
+                <a:effectLst/>
+                <a:latin typeface="Aptos" panose="020B0004020202020204" pitchFamily="34" charset="0"/>
+                <a:ea typeface="Aptos" panose="020B0004020202020204" pitchFamily="34" charset="0"/>
+                <a:cs typeface="Times New Roman" panose="02020603050405020304" pitchFamily="18" charset="0"/>
+              </a:rPr>
+              <a:t>5</a:t>
+            </a:r>
+            <a:r>
+              <a:rPr lang="en-GB" sz="1800" kern="100" baseline="30000" dirty="0">
+                <a:effectLst/>
+                <a:latin typeface="Aptos" panose="020B0004020202020204" pitchFamily="34" charset="0"/>
+                <a:ea typeface="Aptos" panose="020B0004020202020204" pitchFamily="34" charset="0"/>
+                <a:cs typeface="Times New Roman" panose="02020603050405020304" pitchFamily="18" charset="0"/>
+              </a:rPr>
+              <a:t>0</a:t>
+            </a:r>
+            <a:endParaRPr lang="en-GB" sz="1800" kern="100" dirty="0">
+              <a:effectLst/>
+              <a:latin typeface="Aptos" panose="020B0004020202020204" pitchFamily="34" charset="0"/>
+              <a:ea typeface="Aptos" panose="020B0004020202020204" pitchFamily="34" charset="0"/>
+              <a:cs typeface="Times New Roman" panose="02020603050405020304" pitchFamily="18" charset="0"/>
+            </a:endParaRPr>
+          </a:p>
+        </p:txBody>
+      </p:sp>
+      <p:pic>
+        <p:nvPicPr>
+          <p:cNvPr id="36" name="Picture 35">
+            <a:extLst>
+              <a:ext uri="{FF2B5EF4-FFF2-40B4-BE49-F238E27FC236}">
+                <a16:creationId xmlns:a16="http://schemas.microsoft.com/office/drawing/2014/main" id="{0B36E9E8-BF92-9DE9-727D-5127E38389CA}"/>
+              </a:ext>
+            </a:extLst>
+          </p:cNvPr>
+          <p:cNvPicPr>
+            <a:picLocks noChangeAspect="1"/>
+          </p:cNvPicPr>
+          <p:nvPr/>
+        </p:nvPicPr>
+        <p:blipFill>
+          <a:blip r:embed="rId3"/>
+          <a:stretch>
+            <a:fillRect/>
+          </a:stretch>
+        </p:blipFill>
+        <p:spPr>
+          <a:xfrm>
+            <a:off x="4495751" y="687111"/>
+            <a:ext cx="7028801" cy="4592976"/>
+          </a:xfrm>
+          <a:prstGeom prst="rect">
+            <a:avLst/>
+          </a:prstGeom>
+        </p:spPr>
+      </p:pic>
+      <p:sp>
+        <p:nvSpPr>
+          <p:cNvPr id="7" name="TextBox 6">
+            <a:extLst>
+              <a:ext uri="{FF2B5EF4-FFF2-40B4-BE49-F238E27FC236}">
+                <a16:creationId xmlns:a16="http://schemas.microsoft.com/office/drawing/2014/main" id="{4903DE21-A5BD-731D-B8E7-465A9039FCCC}"/>
+              </a:ext>
+            </a:extLst>
+          </p:cNvPr>
+          <p:cNvSpPr txBox="1"/>
+          <p:nvPr/>
+        </p:nvSpPr>
+        <p:spPr>
+          <a:xfrm>
+            <a:off x="542797" y="4406160"/>
+            <a:ext cx="1162975" cy="646331"/>
+          </a:xfrm>
+          <a:prstGeom prst="rect">
+            <a:avLst/>
+          </a:prstGeom>
+          <a:noFill/>
+        </p:spPr>
+        <p:txBody>
+          <a:bodyPr wrap="square" rtlCol="0">
+            <a:spAutoFit/>
+          </a:bodyPr>
+          <a:lstStyle/>
+          <a:p>
+            <a:r>
+              <a:rPr lang="en-GB" dirty="0"/>
+              <a:t>X-axis Direction</a:t>
+            </a:r>
+          </a:p>
+        </p:txBody>
+      </p:sp>
+      <p:sp>
+        <p:nvSpPr>
+          <p:cNvPr id="8" name="Flowchart: Connector 7">
+            <a:extLst>
+              <a:ext uri="{FF2B5EF4-FFF2-40B4-BE49-F238E27FC236}">
+                <a16:creationId xmlns:a16="http://schemas.microsoft.com/office/drawing/2014/main" id="{FB96151A-0473-610B-8843-7236F2380872}"/>
+              </a:ext>
+            </a:extLst>
+          </p:cNvPr>
+          <p:cNvSpPr/>
+          <p:nvPr/>
+        </p:nvSpPr>
+        <p:spPr>
+          <a:xfrm>
+            <a:off x="1315795" y="4516261"/>
+            <a:ext cx="204186" cy="213064"/>
+          </a:xfrm>
+          <a:prstGeom prst="flowChartConnector">
+            <a:avLst/>
+          </a:prstGeom>
+        </p:spPr>
+        <p:style>
+          <a:lnRef idx="2">
+            <a:schemeClr val="dk1">
+              <a:shade val="15000"/>
+            </a:schemeClr>
+          </a:lnRef>
+          <a:fillRef idx="1">
+            <a:schemeClr val="dk1"/>
+          </a:fillRef>
+          <a:effectRef idx="0">
+            <a:schemeClr val="dk1"/>
+          </a:effectRef>
+          <a:fontRef idx="minor">
+            <a:schemeClr val="lt1"/>
+          </a:fontRef>
+        </p:style>
+        <p:txBody>
+          <a:bodyPr rtlCol="0" anchor="ctr"/>
+          <a:lstStyle/>
+          <a:p>
+            <a:pPr algn="ctr"/>
+            <a:endParaRPr lang="en-GB"/>
+          </a:p>
+        </p:txBody>
+      </p:sp>
     </p:spTree>
     <p:extLst>
       <p:ext uri="{BB962C8B-B14F-4D97-AF65-F5344CB8AC3E}">
-        <p14:creationId xmlns:p14="http://schemas.microsoft.com/office/powerpoint/2010/main" val="1159066372"/>
+        <p14:creationId xmlns:p14="http://schemas.microsoft.com/office/powerpoint/2010/main" val="321303667"/>
       </p:ext>
     </p:extLst>
   </p:cSld>
@@ -3772,10 +5135,10 @@
       </p:grpSpPr>
       <p:pic>
         <p:nvPicPr>
-          <p:cNvPr id="3" name="Picture 2">
-            <a:extLst>
-              <a:ext uri="{FF2B5EF4-FFF2-40B4-BE49-F238E27FC236}">
-                <a16:creationId xmlns:a16="http://schemas.microsoft.com/office/drawing/2014/main" id="{E2FDF45A-874F-EFEF-0F15-4B3907DEAB70}"/>
+          <p:cNvPr id="13" name="Picture 12">
+            <a:extLst>
+              <a:ext uri="{FF2B5EF4-FFF2-40B4-BE49-F238E27FC236}">
+                <a16:creationId xmlns:a16="http://schemas.microsoft.com/office/drawing/2014/main" id="{0DDC1991-DE4C-1B6E-D5AC-31CF97FFA5AF}"/>
               </a:ext>
             </a:extLst>
           </p:cNvPr>
@@ -3791,97 +5154,21 @@
           </a:stretch>
         </p:blipFill>
         <p:spPr>
-          <a:xfrm rot="18980188">
-            <a:off x="1040731" y="2292985"/>
-            <a:ext cx="2912578" cy="2850709"/>
+          <a:xfrm>
+            <a:off x="511995" y="1052281"/>
+            <a:ext cx="4159525" cy="4251414"/>
           </a:xfrm>
           <a:prstGeom prst="rect">
             <a:avLst/>
           </a:prstGeom>
         </p:spPr>
       </p:pic>
-      <p:cxnSp>
-        <p:nvCxnSpPr>
-          <p:cNvPr id="5" name="Straight Arrow Connector 4">
-            <a:extLst>
-              <a:ext uri="{FF2B5EF4-FFF2-40B4-BE49-F238E27FC236}">
-                <a16:creationId xmlns:a16="http://schemas.microsoft.com/office/drawing/2014/main" id="{D70ED7BC-242A-5A5A-7A71-1E5452F491AC}"/>
-              </a:ext>
-            </a:extLst>
-          </p:cNvPr>
-          <p:cNvCxnSpPr>
-            <a:cxnSpLocks/>
-          </p:cNvCxnSpPr>
-          <p:nvPr/>
-        </p:nvCxnSpPr>
-        <p:spPr>
-          <a:xfrm flipV="1">
-            <a:off x="583974" y="1833999"/>
-            <a:ext cx="1778393" cy="1612685"/>
-          </a:xfrm>
-          <a:prstGeom prst="straightConnector1">
-            <a:avLst/>
-          </a:prstGeom>
-          <a:ln>
-            <a:tailEnd type="triangle"/>
-          </a:ln>
-        </p:spPr>
-        <p:style>
-          <a:lnRef idx="2">
-            <a:schemeClr val="accent1"/>
-          </a:lnRef>
-          <a:fillRef idx="0">
-            <a:schemeClr val="accent1"/>
-          </a:fillRef>
-          <a:effectRef idx="1">
-            <a:schemeClr val="accent1"/>
-          </a:effectRef>
-          <a:fontRef idx="minor">
-            <a:schemeClr val="tx1"/>
-          </a:fontRef>
-        </p:style>
-      </p:cxnSp>
-      <p:sp>
-        <p:nvSpPr>
-          <p:cNvPr id="6" name="TextBox 5">
-            <a:extLst>
-              <a:ext uri="{FF2B5EF4-FFF2-40B4-BE49-F238E27FC236}">
-                <a16:creationId xmlns:a16="http://schemas.microsoft.com/office/drawing/2014/main" id="{B8D3EF38-0950-5E22-1CBB-F74571011702}"/>
-              </a:ext>
-            </a:extLst>
-          </p:cNvPr>
-          <p:cNvSpPr txBox="1"/>
-          <p:nvPr/>
-        </p:nvSpPr>
-        <p:spPr>
-          <a:xfrm>
-            <a:off x="252153" y="2107707"/>
-            <a:ext cx="1471044" cy="369332"/>
-          </a:xfrm>
-          <a:prstGeom prst="rect">
-            <a:avLst/>
-          </a:prstGeom>
-          <a:noFill/>
-        </p:spPr>
-        <p:txBody>
-          <a:bodyPr wrap="none" rtlCol="0">
-            <a:spAutoFit/>
-          </a:bodyPr>
-          <a:lstStyle/>
-          <a:p>
-            <a:r>
-              <a:rPr lang="en-GB" dirty="0"/>
-              <a:t>Eta Direction</a:t>
-            </a:r>
-          </a:p>
-        </p:txBody>
-      </p:sp>
-      <p:sp>
-        <p:nvSpPr>
-          <p:cNvPr id="10" name="Flowchart: Connector 9">
-            <a:extLst>
-              <a:ext uri="{FF2B5EF4-FFF2-40B4-BE49-F238E27FC236}">
-                <a16:creationId xmlns:a16="http://schemas.microsoft.com/office/drawing/2014/main" id="{8E6DDC60-28F8-3362-4A27-34E1B8C3BB37}"/>
+      <p:sp>
+        <p:nvSpPr>
+          <p:cNvPr id="14" name="Flowchart: Connector 13">
+            <a:extLst>
+              <a:ext uri="{FF2B5EF4-FFF2-40B4-BE49-F238E27FC236}">
+                <a16:creationId xmlns:a16="http://schemas.microsoft.com/office/drawing/2014/main" id="{92BEE03D-C4E3-02F9-85E2-FB353E509BA3}"/>
               </a:ext>
             </a:extLst>
           </p:cNvPr>
@@ -3890,7 +5177,7 @@
         </p:nvSpPr>
         <p:spPr>
           <a:xfrm>
-            <a:off x="1874096" y="5207779"/>
+            <a:off x="4868309" y="3889967"/>
             <a:ext cx="204186" cy="213064"/>
           </a:xfrm>
           <a:prstGeom prst="flowChartConnector">
@@ -3924,10 +5211,10 @@
       </p:sp>
       <p:sp>
         <p:nvSpPr>
-          <p:cNvPr id="11" name="TextBox 10">
-            <a:extLst>
-              <a:ext uri="{FF2B5EF4-FFF2-40B4-BE49-F238E27FC236}">
-                <a16:creationId xmlns:a16="http://schemas.microsoft.com/office/drawing/2014/main" id="{3346D8F7-B829-EC7A-5BB1-AFAF6E2487B5}"/>
+          <p:cNvPr id="15" name="TextBox 14">
+            <a:extLst>
+              <a:ext uri="{FF2B5EF4-FFF2-40B4-BE49-F238E27FC236}">
+                <a16:creationId xmlns:a16="http://schemas.microsoft.com/office/drawing/2014/main" id="{DDBD601E-D7DB-BCDD-A2AC-6C442F4A4201}"/>
               </a:ext>
             </a:extLst>
           </p:cNvPr>
@@ -3936,7 +5223,7 @@
         </p:nvSpPr>
         <p:spPr>
           <a:xfrm>
-            <a:off x="1199392" y="5184728"/>
+            <a:off x="4193605" y="3866916"/>
             <a:ext cx="1162975" cy="646331"/>
           </a:xfrm>
           <a:prstGeom prst="rect">
@@ -3952,27 +5239,105 @@
           <a:p>
             <a:r>
               <a:rPr lang="en-GB" dirty="0"/>
-              <a:t>Phi Direction</a:t>
+              <a:t>Eta Direction</a:t>
             </a:r>
           </a:p>
         </p:txBody>
       </p:sp>
       <p:cxnSp>
         <p:nvCxnSpPr>
-          <p:cNvPr id="13" name="Straight Arrow Connector 12">
-            <a:extLst>
-              <a:ext uri="{FF2B5EF4-FFF2-40B4-BE49-F238E27FC236}">
-                <a16:creationId xmlns:a16="http://schemas.microsoft.com/office/drawing/2014/main" id="{15341FFD-D74F-E200-6019-AC261946D22B}"/>
-              </a:ext>
-            </a:extLst>
-          </p:cNvPr>
-          <p:cNvCxnSpPr/>
+          <p:cNvPr id="16" name="Straight Arrow Connector 15">
+            <a:extLst>
+              <a:ext uri="{FF2B5EF4-FFF2-40B4-BE49-F238E27FC236}">
+                <a16:creationId xmlns:a16="http://schemas.microsoft.com/office/drawing/2014/main" id="{E334D0FC-1353-A8F1-81A8-E6C196B33528}"/>
+              </a:ext>
+            </a:extLst>
+          </p:cNvPr>
+          <p:cNvCxnSpPr>
+            <a:cxnSpLocks/>
+          </p:cNvCxnSpPr>
           <p:nvPr/>
         </p:nvCxnSpPr>
         <p:spPr>
-          <a:xfrm flipH="1" flipV="1">
-            <a:off x="1928919" y="2943973"/>
-            <a:ext cx="1435068" cy="1633491"/>
+          <a:xfrm flipV="1">
+            <a:off x="1108732" y="4953000"/>
+            <a:ext cx="2966050" cy="17684"/>
+          </a:xfrm>
+          <a:prstGeom prst="straightConnector1">
+            <a:avLst/>
+          </a:prstGeom>
+          <a:ln>
+            <a:tailEnd type="triangle"/>
+          </a:ln>
+        </p:spPr>
+        <p:style>
+          <a:lnRef idx="2">
+            <a:schemeClr val="accent1"/>
+          </a:lnRef>
+          <a:fillRef idx="0">
+            <a:schemeClr val="accent1"/>
+          </a:fillRef>
+          <a:effectRef idx="1">
+            <a:schemeClr val="accent1"/>
+          </a:effectRef>
+          <a:fontRef idx="minor">
+            <a:schemeClr val="tx1"/>
+          </a:fontRef>
+        </p:style>
+      </p:cxnSp>
+      <p:sp>
+        <p:nvSpPr>
+          <p:cNvPr id="18" name="TextBox 17">
+            <a:extLst>
+              <a:ext uri="{FF2B5EF4-FFF2-40B4-BE49-F238E27FC236}">
+                <a16:creationId xmlns:a16="http://schemas.microsoft.com/office/drawing/2014/main" id="{62CB471D-C545-3D15-D271-953278477101}"/>
+              </a:ext>
+            </a:extLst>
+          </p:cNvPr>
+          <p:cNvSpPr txBox="1"/>
+          <p:nvPr/>
+        </p:nvSpPr>
+        <p:spPr>
+          <a:xfrm>
+            <a:off x="1840586" y="4970684"/>
+            <a:ext cx="2247966" cy="369332"/>
+          </a:xfrm>
+          <a:prstGeom prst="rect">
+            <a:avLst/>
+          </a:prstGeom>
+          <a:noFill/>
+        </p:spPr>
+        <p:txBody>
+          <a:bodyPr wrap="square" rtlCol="0">
+            <a:spAutoFit/>
+          </a:bodyPr>
+          <a:lstStyle/>
+          <a:p>
+            <a:r>
+              <a:rPr lang="en-GB" dirty="0"/>
+              <a:t>Phi Direction</a:t>
+            </a:r>
+          </a:p>
+        </p:txBody>
+      </p:sp>
+      <p:cxnSp>
+        <p:nvCxnSpPr>
+          <p:cNvPr id="19" name="Straight Arrow Connector 18">
+            <a:extLst>
+              <a:ext uri="{FF2B5EF4-FFF2-40B4-BE49-F238E27FC236}">
+                <a16:creationId xmlns:a16="http://schemas.microsoft.com/office/drawing/2014/main" id="{32EFD0B3-E898-D2D8-F099-4A20310D98D3}"/>
+              </a:ext>
+            </a:extLst>
+          </p:cNvPr>
+          <p:cNvCxnSpPr>
+            <a:cxnSpLocks/>
+          </p:cNvCxnSpPr>
+          <p:nvPr/>
+        </p:nvCxnSpPr>
+        <p:spPr>
+          <a:xfrm flipV="1">
+            <a:off x="2646811" y="1192306"/>
+            <a:ext cx="0" cy="2910725"/>
           </a:xfrm>
           <a:prstGeom prst="straightConnector1">
             <a:avLst/>
@@ -3998,10 +5363,10 @@
       </p:cxnSp>
       <p:sp>
         <p:nvSpPr>
-          <p:cNvPr id="16" name="Partial Circle 15">
-            <a:extLst>
-              <a:ext uri="{FF2B5EF4-FFF2-40B4-BE49-F238E27FC236}">
-                <a16:creationId xmlns:a16="http://schemas.microsoft.com/office/drawing/2014/main" id="{ED44CD69-685C-BCC9-9F2C-AFB10F140288}"/>
+          <p:cNvPr id="22" name="Partial Circle 21">
+            <a:extLst>
+              <a:ext uri="{FF2B5EF4-FFF2-40B4-BE49-F238E27FC236}">
+                <a16:creationId xmlns:a16="http://schemas.microsoft.com/office/drawing/2014/main" id="{FCD5AF97-1466-C0FB-8CDD-ED8258CF4C23}"/>
               </a:ext>
             </a:extLst>
           </p:cNvPr>
@@ -4009,8 +5374,8 @@
           <p:nvPr/>
         </p:nvSpPr>
         <p:spPr>
-          <a:xfrm>
-            <a:off x="923267" y="4202706"/>
+          <a:xfrm rot="18847305">
+            <a:off x="1133168" y="2820208"/>
             <a:ext cx="3027286" cy="2565647"/>
           </a:xfrm>
           <a:prstGeom prst="pie">
@@ -4057,10 +5422,10 @@
       </p:sp>
       <p:sp>
         <p:nvSpPr>
-          <p:cNvPr id="17" name="TextBox 16">
-            <a:extLst>
-              <a:ext uri="{FF2B5EF4-FFF2-40B4-BE49-F238E27FC236}">
-                <a16:creationId xmlns:a16="http://schemas.microsoft.com/office/drawing/2014/main" id="{6FA9354A-03CC-A3CC-E8C6-668588625393}"/>
+          <p:cNvPr id="24" name="TextBox 23">
+            <a:extLst>
+              <a:ext uri="{FF2B5EF4-FFF2-40B4-BE49-F238E27FC236}">
+                <a16:creationId xmlns:a16="http://schemas.microsoft.com/office/drawing/2014/main" id="{5972C598-F924-5A10-B4BF-B7672EA4D8D4}"/>
               </a:ext>
             </a:extLst>
           </p:cNvPr>
@@ -4069,8 +5434,8 @@
         </p:nvSpPr>
         <p:spPr>
           <a:xfrm>
-            <a:off x="2779524" y="5031220"/>
-            <a:ext cx="871459" cy="378565"/>
+            <a:off x="2779059" y="3257266"/>
+            <a:ext cx="824753" cy="369332"/>
           </a:xfrm>
           <a:prstGeom prst="rect">
             <a:avLst/>
@@ -4078,337 +5443,31 @@
           <a:noFill/>
         </p:spPr>
         <p:txBody>
-          <a:bodyPr wrap="square" rtlCol="0">
+          <a:bodyPr wrap="square">
             <a:spAutoFit/>
           </a:bodyPr>
           <a:lstStyle/>
           <a:p>
-            <a:pPr>
-              <a:lnSpc>
-                <a:spcPct val="107000"/>
-              </a:lnSpc>
-              <a:spcAft>
-                <a:spcPts val="800"/>
-              </a:spcAft>
-            </a:pPr>
-            <a:r>
-              <a:rPr lang="en-GB" sz="1800" kern="100" dirty="0">
+            <a:r>
+              <a:rPr lang="el-GR" b="0" i="0" dirty="0">
+                <a:solidFill>
+                  <a:srgbClr val="1F1F1F"/>
+                </a:solidFill>
                 <a:effectLst/>
-                <a:latin typeface="Aptos" panose="020B0004020202020204" pitchFamily="34" charset="0"/>
-                <a:ea typeface="Aptos" panose="020B0004020202020204" pitchFamily="34" charset="0"/>
-                <a:cs typeface="Times New Roman" panose="02020603050405020304" pitchFamily="18" charset="0"/>
+                <a:latin typeface="Google Sans"/>
               </a:rPr>
-              <a:t>45</a:t>
-            </a:r>
-            <a:r>
-              <a:rPr lang="en-GB" sz="1800" kern="100" baseline="30000" dirty="0">
-                <a:effectLst/>
-                <a:latin typeface="Aptos" panose="020B0004020202020204" pitchFamily="34" charset="0"/>
-                <a:ea typeface="Aptos" panose="020B0004020202020204" pitchFamily="34" charset="0"/>
-                <a:cs typeface="Times New Roman" panose="02020603050405020304" pitchFamily="18" charset="0"/>
-              </a:rPr>
-              <a:t>0</a:t>
-            </a:r>
-            <a:endParaRPr lang="en-GB" sz="1800" kern="100" dirty="0">
-              <a:effectLst/>
-              <a:latin typeface="Aptos" panose="020B0004020202020204" pitchFamily="34" charset="0"/>
-              <a:ea typeface="Aptos" panose="020B0004020202020204" pitchFamily="34" charset="0"/>
-              <a:cs typeface="Times New Roman" panose="02020603050405020304" pitchFamily="18" charset="0"/>
-            </a:endParaRPr>
-          </a:p>
-        </p:txBody>
-      </p:sp>
-      <p:sp>
-        <p:nvSpPr>
-          <p:cNvPr id="19" name="TextBox 18">
-            <a:extLst>
-              <a:ext uri="{FF2B5EF4-FFF2-40B4-BE49-F238E27FC236}">
-                <a16:creationId xmlns:a16="http://schemas.microsoft.com/office/drawing/2014/main" id="{42AA3CD3-71C3-29A7-0CC5-7AF97FCF5EC1}"/>
-              </a:ext>
-            </a:extLst>
-          </p:cNvPr>
-          <p:cNvSpPr txBox="1"/>
-          <p:nvPr/>
-        </p:nvSpPr>
-        <p:spPr>
-          <a:xfrm>
-            <a:off x="2815148" y="3559667"/>
-            <a:ext cx="871459" cy="378565"/>
-          </a:xfrm>
-          <a:prstGeom prst="rect">
-            <a:avLst/>
-          </a:prstGeom>
-          <a:noFill/>
-        </p:spPr>
-        <p:txBody>
-          <a:bodyPr wrap="square" rtlCol="0">
-            <a:spAutoFit/>
-          </a:bodyPr>
-          <a:lstStyle/>
-          <a:p>
-            <a:pPr>
-              <a:lnSpc>
-                <a:spcPct val="107000"/>
-              </a:lnSpc>
-              <a:spcAft>
-                <a:spcPts val="800"/>
-              </a:spcAft>
-            </a:pPr>
-            <a:r>
-              <a:rPr lang="en-GB" sz="1800" kern="100" dirty="0">
-                <a:effectLst/>
-                <a:latin typeface="Aptos" panose="020B0004020202020204" pitchFamily="34" charset="0"/>
-                <a:ea typeface="Aptos" panose="020B0004020202020204" pitchFamily="34" charset="0"/>
-                <a:cs typeface="Times New Roman" panose="02020603050405020304" pitchFamily="18" charset="0"/>
-              </a:rPr>
-              <a:t>50</a:t>
-            </a:r>
-            <a:r>
-              <a:rPr lang="en-GB" sz="1800" kern="100" baseline="30000" dirty="0">
-                <a:effectLst/>
-                <a:latin typeface="Aptos" panose="020B0004020202020204" pitchFamily="34" charset="0"/>
-                <a:ea typeface="Aptos" panose="020B0004020202020204" pitchFamily="34" charset="0"/>
-                <a:cs typeface="Times New Roman" panose="02020603050405020304" pitchFamily="18" charset="0"/>
-              </a:rPr>
-              <a:t>0</a:t>
-            </a:r>
-            <a:endParaRPr lang="en-GB" sz="1800" kern="100" dirty="0">
-              <a:effectLst/>
-              <a:latin typeface="Aptos" panose="020B0004020202020204" pitchFamily="34" charset="0"/>
-              <a:ea typeface="Aptos" panose="020B0004020202020204" pitchFamily="34" charset="0"/>
-              <a:cs typeface="Times New Roman" panose="02020603050405020304" pitchFamily="18" charset="0"/>
-            </a:endParaRPr>
-          </a:p>
-        </p:txBody>
-      </p:sp>
-      <p:cxnSp>
-        <p:nvCxnSpPr>
-          <p:cNvPr id="20" name="Straight Arrow Connector 19">
-            <a:extLst>
-              <a:ext uri="{FF2B5EF4-FFF2-40B4-BE49-F238E27FC236}">
-                <a16:creationId xmlns:a16="http://schemas.microsoft.com/office/drawing/2014/main" id="{6E06FC1B-FB6E-827B-DD46-1603302E3920}"/>
-              </a:ext>
-            </a:extLst>
-          </p:cNvPr>
-          <p:cNvCxnSpPr>
-            <a:cxnSpLocks/>
-          </p:cNvCxnSpPr>
-          <p:nvPr/>
-        </p:nvCxnSpPr>
-        <p:spPr>
-          <a:xfrm flipH="1" flipV="1">
-            <a:off x="3331575" y="914916"/>
-            <a:ext cx="24762" cy="4592977"/>
-          </a:xfrm>
-          <a:prstGeom prst="straightConnector1">
-            <a:avLst/>
-          </a:prstGeom>
-          <a:ln w="57150">
-            <a:tailEnd type="triangle"/>
-          </a:ln>
-        </p:spPr>
-        <p:style>
-          <a:lnRef idx="2">
-            <a:schemeClr val="dk1"/>
-          </a:lnRef>
-          <a:fillRef idx="0">
-            <a:schemeClr val="dk1"/>
-          </a:fillRef>
-          <a:effectRef idx="1">
-            <a:schemeClr val="dk1"/>
-          </a:effectRef>
-          <a:fontRef idx="minor">
-            <a:schemeClr val="tx1"/>
-          </a:fontRef>
-        </p:style>
-      </p:cxnSp>
-      <p:sp>
-        <p:nvSpPr>
-          <p:cNvPr id="24" name="Partial Circle 23">
-            <a:extLst>
-              <a:ext uri="{FF2B5EF4-FFF2-40B4-BE49-F238E27FC236}">
-                <a16:creationId xmlns:a16="http://schemas.microsoft.com/office/drawing/2014/main" id="{D7EB1C07-290C-2CA0-0BAE-925D297AEBAC}"/>
-              </a:ext>
-            </a:extLst>
-          </p:cNvPr>
-          <p:cNvSpPr/>
-          <p:nvPr/>
-        </p:nvSpPr>
-        <p:spPr>
-          <a:xfrm rot="17686702">
-            <a:off x="1770871" y="3034295"/>
-            <a:ext cx="3146171" cy="2988639"/>
-          </a:xfrm>
-          <a:prstGeom prst="pie">
-            <a:avLst>
-              <a:gd name="adj1" fmla="val 20169912"/>
-              <a:gd name="adj2" fmla="val 20959479"/>
-            </a:avLst>
-          </a:prstGeom>
-          <a:solidFill>
-            <a:schemeClr val="accent5">
-              <a:alpha val="50000"/>
-            </a:schemeClr>
-          </a:solidFill>
-          <a:ln>
-            <a:noFill/>
-          </a:ln>
-        </p:spPr>
-        <p:style>
-          <a:lnRef idx="0">
-            <a:scrgbClr r="0" g="0" b="0"/>
-          </a:lnRef>
-          <a:fillRef idx="0">
-            <a:scrgbClr r="0" g="0" b="0"/>
-          </a:fillRef>
-          <a:effectRef idx="0">
-            <a:scrgbClr r="0" g="0" b="0"/>
-          </a:effectRef>
-          <a:fontRef idx="minor">
-            <a:schemeClr val="lt1"/>
-          </a:fontRef>
-        </p:style>
-        <p:txBody>
-          <a:bodyPr rtlCol="0" anchor="ctr"/>
-          <a:lstStyle/>
-          <a:p>
-            <a:pPr algn="ctr"/>
-            <a:endParaRPr lang="en-GB">
-              <a:solidFill>
-                <a:schemeClr val="tx1"/>
-              </a:solidFill>
-            </a:endParaRPr>
-          </a:p>
-        </p:txBody>
-      </p:sp>
-      <p:sp>
-        <p:nvSpPr>
-          <p:cNvPr id="18" name="Partial Circle 17">
-            <a:extLst>
-              <a:ext uri="{FF2B5EF4-FFF2-40B4-BE49-F238E27FC236}">
-                <a16:creationId xmlns:a16="http://schemas.microsoft.com/office/drawing/2014/main" id="{DBA34E40-956C-CAC8-887E-246E91CB6B92}"/>
-              </a:ext>
-            </a:extLst>
-          </p:cNvPr>
-          <p:cNvSpPr/>
-          <p:nvPr/>
-        </p:nvSpPr>
-        <p:spPr>
-          <a:xfrm rot="17686702">
-            <a:off x="1979055" y="3372578"/>
-            <a:ext cx="2729801" cy="2312074"/>
-          </a:xfrm>
-          <a:prstGeom prst="pie">
-            <a:avLst>
-              <a:gd name="adj1" fmla="val 17664541"/>
-              <a:gd name="adj2" fmla="val 20962643"/>
-            </a:avLst>
-          </a:prstGeom>
-          <a:solidFill>
-            <a:schemeClr val="accent6">
-              <a:alpha val="50000"/>
-            </a:schemeClr>
-          </a:solidFill>
-          <a:ln>
-            <a:noFill/>
-          </a:ln>
-        </p:spPr>
-        <p:style>
-          <a:lnRef idx="0">
-            <a:scrgbClr r="0" g="0" b="0"/>
-          </a:lnRef>
-          <a:fillRef idx="0">
-            <a:scrgbClr r="0" g="0" b="0"/>
-          </a:fillRef>
-          <a:effectRef idx="0">
-            <a:scrgbClr r="0" g="0" b="0"/>
-          </a:effectRef>
-          <a:fontRef idx="minor">
-            <a:schemeClr val="lt1"/>
-          </a:fontRef>
-        </p:style>
-        <p:txBody>
-          <a:bodyPr rtlCol="0" anchor="ctr"/>
-          <a:lstStyle/>
-          <a:p>
-            <a:pPr algn="ctr"/>
-            <a:endParaRPr lang="en-GB" dirty="0">
-              <a:solidFill>
-                <a:schemeClr val="tx1"/>
-              </a:solidFill>
-            </a:endParaRPr>
-          </a:p>
-        </p:txBody>
-      </p:sp>
-      <p:sp>
-        <p:nvSpPr>
-          <p:cNvPr id="25" name="TextBox 24">
-            <a:extLst>
-              <a:ext uri="{FF2B5EF4-FFF2-40B4-BE49-F238E27FC236}">
-                <a16:creationId xmlns:a16="http://schemas.microsoft.com/office/drawing/2014/main" id="{0FFB31CC-C20A-4E52-A562-3224278F277F}"/>
-              </a:ext>
-            </a:extLst>
-          </p:cNvPr>
-          <p:cNvSpPr txBox="1"/>
-          <p:nvPr/>
-        </p:nvSpPr>
-        <p:spPr>
-          <a:xfrm>
-            <a:off x="3421968" y="2826421"/>
-            <a:ext cx="871459" cy="378565"/>
-          </a:xfrm>
-          <a:prstGeom prst="rect">
-            <a:avLst/>
-          </a:prstGeom>
-          <a:noFill/>
-        </p:spPr>
-        <p:txBody>
-          <a:bodyPr wrap="square" rtlCol="0">
-            <a:spAutoFit/>
-          </a:bodyPr>
-          <a:lstStyle/>
-          <a:p>
-            <a:pPr>
-              <a:lnSpc>
-                <a:spcPct val="107000"/>
-              </a:lnSpc>
-              <a:spcAft>
-                <a:spcPts val="800"/>
-              </a:spcAft>
-            </a:pPr>
-            <a:r>
-              <a:rPr lang="en-GB" sz="1800" kern="100" dirty="0">
-                <a:effectLst/>
-                <a:latin typeface="Aptos" panose="020B0004020202020204" pitchFamily="34" charset="0"/>
-                <a:ea typeface="Aptos" panose="020B0004020202020204" pitchFamily="34" charset="0"/>
-                <a:cs typeface="Times New Roman" panose="02020603050405020304" pitchFamily="18" charset="0"/>
-              </a:rPr>
-              <a:t>5</a:t>
-            </a:r>
-            <a:r>
-              <a:rPr lang="en-GB" sz="1800" kern="100" baseline="30000" dirty="0">
-                <a:effectLst/>
-                <a:latin typeface="Aptos" panose="020B0004020202020204" pitchFamily="34" charset="0"/>
-                <a:ea typeface="Aptos" panose="020B0004020202020204" pitchFamily="34" charset="0"/>
-                <a:cs typeface="Times New Roman" panose="02020603050405020304" pitchFamily="18" charset="0"/>
-              </a:rPr>
-              <a:t>0</a:t>
-            </a:r>
-            <a:endParaRPr lang="en-GB" sz="1800" kern="100" dirty="0">
-              <a:effectLst/>
-              <a:latin typeface="Aptos" panose="020B0004020202020204" pitchFamily="34" charset="0"/>
-              <a:ea typeface="Aptos" panose="020B0004020202020204" pitchFamily="34" charset="0"/>
-              <a:cs typeface="Times New Roman" panose="02020603050405020304" pitchFamily="18" charset="0"/>
-            </a:endParaRPr>
+              <a:t>θ</a:t>
+            </a:r>
+            <a:endParaRPr lang="en-GB" dirty="0"/>
           </a:p>
         </p:txBody>
       </p:sp>
       <p:pic>
         <p:nvPicPr>
-          <p:cNvPr id="36" name="Picture 35">
-            <a:extLst>
-              <a:ext uri="{FF2B5EF4-FFF2-40B4-BE49-F238E27FC236}">
-                <a16:creationId xmlns:a16="http://schemas.microsoft.com/office/drawing/2014/main" id="{0B36E9E8-BF92-9DE9-727D-5127E38389CA}"/>
+          <p:cNvPr id="28" name="Picture 27">
+            <a:extLst>
+              <a:ext uri="{FF2B5EF4-FFF2-40B4-BE49-F238E27FC236}">
+                <a16:creationId xmlns:a16="http://schemas.microsoft.com/office/drawing/2014/main" id="{2D27D9B4-1F91-DB48-C6DB-6E06BC3288F2}"/>
               </a:ext>
             </a:extLst>
           </p:cNvPr>
@@ -4425,18 +5484,99 @@
         </p:blipFill>
         <p:spPr>
           <a:xfrm>
-            <a:off x="4495751" y="687111"/>
-            <a:ext cx="7028801" cy="4592976"/>
+            <a:off x="5969938" y="1255059"/>
+            <a:ext cx="5549918" cy="3626598"/>
           </a:xfrm>
           <a:prstGeom prst="rect">
             <a:avLst/>
           </a:prstGeom>
         </p:spPr>
       </p:pic>
+      <p:sp>
+        <p:nvSpPr>
+          <p:cNvPr id="2" name="TextBox 1">
+            <a:extLst>
+              <a:ext uri="{FF2B5EF4-FFF2-40B4-BE49-F238E27FC236}">
+                <a16:creationId xmlns:a16="http://schemas.microsoft.com/office/drawing/2014/main" id="{FF774B36-0FB7-D0C8-2CBB-42A3DBCC2CD0}"/>
+              </a:ext>
+            </a:extLst>
+          </p:cNvPr>
+          <p:cNvSpPr txBox="1"/>
+          <p:nvPr/>
+        </p:nvSpPr>
+        <p:spPr>
+          <a:xfrm>
+            <a:off x="4281941" y="2610935"/>
+            <a:ext cx="1162975" cy="646331"/>
+          </a:xfrm>
+          <a:prstGeom prst="rect">
+            <a:avLst/>
+          </a:prstGeom>
+          <a:noFill/>
+        </p:spPr>
+        <p:txBody>
+          <a:bodyPr wrap="square" rtlCol="0">
+            <a:spAutoFit/>
+          </a:bodyPr>
+          <a:lstStyle/>
+          <a:p>
+            <a:r>
+              <a:rPr lang="en-GB" dirty="0"/>
+              <a:t>Y-axis Direction</a:t>
+            </a:r>
+          </a:p>
+        </p:txBody>
+      </p:sp>
+      <p:sp>
+        <p:nvSpPr>
+          <p:cNvPr id="3" name="Multiplication Sign 2">
+            <a:extLst>
+              <a:ext uri="{FF2B5EF4-FFF2-40B4-BE49-F238E27FC236}">
+                <a16:creationId xmlns:a16="http://schemas.microsoft.com/office/drawing/2014/main" id="{F5E7E9AD-3832-38C7-AC4E-3624A58E3B9C}"/>
+              </a:ext>
+            </a:extLst>
+          </p:cNvPr>
+          <p:cNvSpPr/>
+          <p:nvPr/>
+        </p:nvSpPr>
+        <p:spPr>
+          <a:xfrm>
+            <a:off x="5002302" y="2539014"/>
+            <a:ext cx="304236" cy="408372"/>
+          </a:xfrm>
+          <a:prstGeom prst="mathMultiply">
+            <a:avLst/>
+          </a:prstGeom>
+        </p:spPr>
+        <p:style>
+          <a:lnRef idx="2">
+            <a:schemeClr val="dk1">
+              <a:shade val="15000"/>
+            </a:schemeClr>
+          </a:lnRef>
+          <a:fillRef idx="1">
+            <a:schemeClr val="dk1"/>
+          </a:fillRef>
+          <a:effectRef idx="0">
+            <a:schemeClr val="dk1"/>
+          </a:effectRef>
+          <a:fontRef idx="minor">
+            <a:schemeClr val="lt1"/>
+          </a:fontRef>
+        </p:style>
+        <p:txBody>
+          <a:bodyPr rtlCol="0" anchor="ctr"/>
+          <a:lstStyle/>
+          <a:p>
+            <a:pPr algn="ctr"/>
+            <a:endParaRPr lang="en-GB"/>
+          </a:p>
+        </p:txBody>
+      </p:sp>
     </p:spTree>
     <p:extLst>
       <p:ext uri="{BB962C8B-B14F-4D97-AF65-F5344CB8AC3E}">
-        <p14:creationId xmlns:p14="http://schemas.microsoft.com/office/powerpoint/2010/main" val="321303667"/>
+        <p14:creationId xmlns:p14="http://schemas.microsoft.com/office/powerpoint/2010/main" val="2212838489"/>
       </p:ext>
     </p:extLst>
   </p:cSld>
@@ -4465,10 +5605,10 @@
       </p:grpSpPr>
       <p:pic>
         <p:nvPicPr>
-          <p:cNvPr id="13" name="Picture 12">
-            <a:extLst>
-              <a:ext uri="{FF2B5EF4-FFF2-40B4-BE49-F238E27FC236}">
-                <a16:creationId xmlns:a16="http://schemas.microsoft.com/office/drawing/2014/main" id="{0DDC1991-DE4C-1B6E-D5AC-31CF97FFA5AF}"/>
+          <p:cNvPr id="31" name="Picture 30">
+            <a:extLst>
+              <a:ext uri="{FF2B5EF4-FFF2-40B4-BE49-F238E27FC236}">
+                <a16:creationId xmlns:a16="http://schemas.microsoft.com/office/drawing/2014/main" id="{28C5B835-11A7-0A12-0506-C2E7A1115DA2}"/>
               </a:ext>
             </a:extLst>
           </p:cNvPr>
@@ -4485,194 +5625,36 @@
         </p:blipFill>
         <p:spPr>
           <a:xfrm>
-            <a:off x="511995" y="1052281"/>
-            <a:ext cx="4159525" cy="4251414"/>
+            <a:off x="18673" y="0"/>
+            <a:ext cx="12173327" cy="6761216"/>
           </a:xfrm>
           <a:prstGeom prst="rect">
             <a:avLst/>
           </a:prstGeom>
         </p:spPr>
       </p:pic>
-      <p:sp>
-        <p:nvSpPr>
-          <p:cNvPr id="14" name="Flowchart: Connector 13">
-            <a:extLst>
-              <a:ext uri="{FF2B5EF4-FFF2-40B4-BE49-F238E27FC236}">
-                <a16:creationId xmlns:a16="http://schemas.microsoft.com/office/drawing/2014/main" id="{92BEE03D-C4E3-02F9-85E2-FB353E509BA3}"/>
-              </a:ext>
-            </a:extLst>
-          </p:cNvPr>
-          <p:cNvSpPr/>
-          <p:nvPr/>
-        </p:nvSpPr>
-        <p:spPr>
-          <a:xfrm>
-            <a:off x="4868309" y="3889967"/>
-            <a:ext cx="204186" cy="213064"/>
-          </a:xfrm>
-          <a:prstGeom prst="flowChartConnector">
-            <a:avLst/>
-          </a:prstGeom>
-        </p:spPr>
-        <p:style>
-          <a:lnRef idx="2">
-            <a:schemeClr val="dk1">
-              <a:shade val="15000"/>
-            </a:schemeClr>
-          </a:lnRef>
-          <a:fillRef idx="1">
-            <a:schemeClr val="dk1"/>
-          </a:fillRef>
-          <a:effectRef idx="0">
-            <a:schemeClr val="dk1"/>
-          </a:effectRef>
-          <a:fontRef idx="minor">
-            <a:schemeClr val="lt1"/>
-          </a:fontRef>
-        </p:style>
-        <p:txBody>
-          <a:bodyPr rtlCol="0" anchor="ctr"/>
-          <a:lstStyle/>
-          <a:p>
-            <a:pPr algn="ctr"/>
-            <a:endParaRPr lang="en-GB"/>
-          </a:p>
-        </p:txBody>
-      </p:sp>
-      <p:sp>
-        <p:nvSpPr>
-          <p:cNvPr id="15" name="TextBox 14">
-            <a:extLst>
-              <a:ext uri="{FF2B5EF4-FFF2-40B4-BE49-F238E27FC236}">
-                <a16:creationId xmlns:a16="http://schemas.microsoft.com/office/drawing/2014/main" id="{DDBD601E-D7DB-BCDD-A2AC-6C442F4A4201}"/>
-              </a:ext>
-            </a:extLst>
-          </p:cNvPr>
-          <p:cNvSpPr txBox="1"/>
-          <p:nvPr/>
-        </p:nvSpPr>
-        <p:spPr>
-          <a:xfrm>
-            <a:off x="4193605" y="3866916"/>
-            <a:ext cx="1162975" cy="646331"/>
-          </a:xfrm>
-          <a:prstGeom prst="rect">
-            <a:avLst/>
-          </a:prstGeom>
-          <a:noFill/>
-        </p:spPr>
-        <p:txBody>
-          <a:bodyPr wrap="square" rtlCol="0">
-            <a:spAutoFit/>
-          </a:bodyPr>
-          <a:lstStyle/>
-          <a:p>
-            <a:r>
-              <a:rPr lang="en-GB" dirty="0"/>
-              <a:t>Eta Direction</a:t>
-            </a:r>
-          </a:p>
-        </p:txBody>
-      </p:sp>
       <p:cxnSp>
         <p:nvCxnSpPr>
-          <p:cNvPr id="16" name="Straight Arrow Connector 15">
-            <a:extLst>
-              <a:ext uri="{FF2B5EF4-FFF2-40B4-BE49-F238E27FC236}">
-                <a16:creationId xmlns:a16="http://schemas.microsoft.com/office/drawing/2014/main" id="{E334D0FC-1353-A8F1-81A8-E6C196B33528}"/>
-              </a:ext>
-            </a:extLst>
-          </p:cNvPr>
-          <p:cNvCxnSpPr>
-            <a:cxnSpLocks/>
-          </p:cNvCxnSpPr>
+          <p:cNvPr id="5" name="Straight Arrow Connector 4">
+            <a:extLst>
+              <a:ext uri="{FF2B5EF4-FFF2-40B4-BE49-F238E27FC236}">
+                <a16:creationId xmlns:a16="http://schemas.microsoft.com/office/drawing/2014/main" id="{5DC2A680-BD5B-AAA2-D3C3-02510F74E0AF}"/>
+              </a:ext>
+            </a:extLst>
+          </p:cNvPr>
+          <p:cNvCxnSpPr/>
           <p:nvPr/>
         </p:nvCxnSpPr>
         <p:spPr>
-          <a:xfrm flipV="1">
-            <a:off x="1108732" y="4953000"/>
-            <a:ext cx="2966050" cy="17684"/>
+          <a:xfrm>
+            <a:off x="1059365" y="1929161"/>
+            <a:ext cx="0" cy="2520175"/>
           </a:xfrm>
           <a:prstGeom prst="straightConnector1">
             <a:avLst/>
           </a:prstGeom>
-          <a:ln>
-            <a:tailEnd type="triangle"/>
-          </a:ln>
-        </p:spPr>
-        <p:style>
-          <a:lnRef idx="2">
-            <a:schemeClr val="accent1"/>
-          </a:lnRef>
-          <a:fillRef idx="0">
-            <a:schemeClr val="accent1"/>
-          </a:fillRef>
-          <a:effectRef idx="1">
-            <a:schemeClr val="accent1"/>
-          </a:effectRef>
-          <a:fontRef idx="minor">
-            <a:schemeClr val="tx1"/>
-          </a:fontRef>
-        </p:style>
-      </p:cxnSp>
-      <p:sp>
-        <p:nvSpPr>
-          <p:cNvPr id="18" name="TextBox 17">
-            <a:extLst>
-              <a:ext uri="{FF2B5EF4-FFF2-40B4-BE49-F238E27FC236}">
-                <a16:creationId xmlns:a16="http://schemas.microsoft.com/office/drawing/2014/main" id="{62CB471D-C545-3D15-D271-953278477101}"/>
-              </a:ext>
-            </a:extLst>
-          </p:cNvPr>
-          <p:cNvSpPr txBox="1"/>
-          <p:nvPr/>
-        </p:nvSpPr>
-        <p:spPr>
-          <a:xfrm>
-            <a:off x="1840586" y="4970684"/>
-            <a:ext cx="2247966" cy="369332"/>
-          </a:xfrm>
-          <a:prstGeom prst="rect">
-            <a:avLst/>
-          </a:prstGeom>
-          <a:noFill/>
-        </p:spPr>
-        <p:txBody>
-          <a:bodyPr wrap="square" rtlCol="0">
-            <a:spAutoFit/>
-          </a:bodyPr>
-          <a:lstStyle/>
-          <a:p>
-            <a:r>
-              <a:rPr lang="en-GB" dirty="0"/>
-              <a:t>Phi Direction</a:t>
-            </a:r>
-          </a:p>
-        </p:txBody>
-      </p:sp>
-      <p:cxnSp>
-        <p:nvCxnSpPr>
-          <p:cNvPr id="19" name="Straight Arrow Connector 18">
-            <a:extLst>
-              <a:ext uri="{FF2B5EF4-FFF2-40B4-BE49-F238E27FC236}">
-                <a16:creationId xmlns:a16="http://schemas.microsoft.com/office/drawing/2014/main" id="{32EFD0B3-E898-D2D8-F099-4A20310D98D3}"/>
-              </a:ext>
-            </a:extLst>
-          </p:cNvPr>
-          <p:cNvCxnSpPr>
-            <a:cxnSpLocks/>
-          </p:cNvCxnSpPr>
-          <p:nvPr/>
-        </p:nvCxnSpPr>
-        <p:spPr>
-          <a:xfrm flipV="1">
-            <a:off x="2646811" y="1192306"/>
-            <a:ext cx="0" cy="2910725"/>
-          </a:xfrm>
-          <a:prstGeom prst="straightConnector1">
-            <a:avLst/>
-          </a:prstGeom>
-          <a:ln w="57150">
+          <a:ln w="76200">
+            <a:headEnd type="triangle"/>
             <a:tailEnd type="triangle"/>
           </a:ln>
         </p:spPr>
@@ -4691,12 +5673,155 @@
           </a:fontRef>
         </p:style>
       </p:cxnSp>
-      <p:sp>
-        <p:nvSpPr>
-          <p:cNvPr id="22" name="Partial Circle 21">
-            <a:extLst>
-              <a:ext uri="{FF2B5EF4-FFF2-40B4-BE49-F238E27FC236}">
-                <a16:creationId xmlns:a16="http://schemas.microsoft.com/office/drawing/2014/main" id="{FCD5AF97-1466-C0FB-8CDD-ED8258CF4C23}"/>
+      <p:cxnSp>
+        <p:nvCxnSpPr>
+          <p:cNvPr id="9" name="Straight Connector 8">
+            <a:extLst>
+              <a:ext uri="{FF2B5EF4-FFF2-40B4-BE49-F238E27FC236}">
+                <a16:creationId xmlns:a16="http://schemas.microsoft.com/office/drawing/2014/main" id="{873BD22B-9FA2-44FE-D217-5D62C3E187DF}"/>
+              </a:ext>
+            </a:extLst>
+          </p:cNvPr>
+          <p:cNvCxnSpPr/>
+          <p:nvPr/>
+        </p:nvCxnSpPr>
+        <p:spPr>
+          <a:xfrm>
+            <a:off x="0" y="1906859"/>
+            <a:ext cx="3412273" cy="0"/>
+          </a:xfrm>
+          <a:prstGeom prst="line">
+            <a:avLst/>
+          </a:prstGeom>
+          <a:ln w="38100">
+            <a:prstDash val="sysDash"/>
+          </a:ln>
+        </p:spPr>
+        <p:style>
+          <a:lnRef idx="2">
+            <a:schemeClr val="dk1"/>
+          </a:lnRef>
+          <a:fillRef idx="0">
+            <a:schemeClr val="dk1"/>
+          </a:fillRef>
+          <a:effectRef idx="1">
+            <a:schemeClr val="dk1"/>
+          </a:effectRef>
+          <a:fontRef idx="minor">
+            <a:schemeClr val="tx1"/>
+          </a:fontRef>
+        </p:style>
+      </p:cxnSp>
+      <p:sp>
+        <p:nvSpPr>
+          <p:cNvPr id="10" name="TextBox 9">
+            <a:extLst>
+              <a:ext uri="{FF2B5EF4-FFF2-40B4-BE49-F238E27FC236}">
+                <a16:creationId xmlns:a16="http://schemas.microsoft.com/office/drawing/2014/main" id="{7912EA06-DA2A-E204-59C3-D4B020DFDC0F}"/>
+              </a:ext>
+            </a:extLst>
+          </p:cNvPr>
+          <p:cNvSpPr txBox="1"/>
+          <p:nvPr/>
+        </p:nvSpPr>
+        <p:spPr>
+          <a:xfrm>
+            <a:off x="0" y="3380608"/>
+            <a:ext cx="814039" cy="369332"/>
+          </a:xfrm>
+          <a:prstGeom prst="rect">
+            <a:avLst/>
+          </a:prstGeom>
+          <a:noFill/>
+        </p:spPr>
+        <p:txBody>
+          <a:bodyPr wrap="square" rtlCol="0">
+            <a:spAutoFit/>
+          </a:bodyPr>
+          <a:lstStyle/>
+          <a:p>
+            <a:r>
+              <a:rPr lang="en-GB" dirty="0"/>
+              <a:t>4.84m</a:t>
+            </a:r>
+          </a:p>
+        </p:txBody>
+      </p:sp>
+      <p:cxnSp>
+        <p:nvCxnSpPr>
+          <p:cNvPr id="11" name="Straight Connector 10">
+            <a:extLst>
+              <a:ext uri="{FF2B5EF4-FFF2-40B4-BE49-F238E27FC236}">
+                <a16:creationId xmlns:a16="http://schemas.microsoft.com/office/drawing/2014/main" id="{4F5B2027-5032-3197-1B43-E785490BFD76}"/>
+              </a:ext>
+            </a:extLst>
+          </p:cNvPr>
+          <p:cNvCxnSpPr/>
+          <p:nvPr/>
+        </p:nvCxnSpPr>
+        <p:spPr>
+          <a:xfrm>
+            <a:off x="18673" y="4445619"/>
+            <a:ext cx="3412273" cy="0"/>
+          </a:xfrm>
+          <a:prstGeom prst="line">
+            <a:avLst/>
+          </a:prstGeom>
+          <a:ln w="38100">
+            <a:prstDash val="sysDash"/>
+          </a:ln>
+        </p:spPr>
+        <p:style>
+          <a:lnRef idx="2">
+            <a:schemeClr val="dk1"/>
+          </a:lnRef>
+          <a:fillRef idx="0">
+            <a:schemeClr val="dk1"/>
+          </a:fillRef>
+          <a:effectRef idx="1">
+            <a:schemeClr val="dk1"/>
+          </a:effectRef>
+          <a:fontRef idx="minor">
+            <a:schemeClr val="tx1"/>
+          </a:fontRef>
+        </p:style>
+      </p:cxnSp>
+      <p:pic>
+        <p:nvPicPr>
+          <p:cNvPr id="4" name="Picture 3">
+            <a:extLst>
+              <a:ext uri="{FF2B5EF4-FFF2-40B4-BE49-F238E27FC236}">
+                <a16:creationId xmlns:a16="http://schemas.microsoft.com/office/drawing/2014/main" id="{4FEA4B33-4DA3-E6E6-F5B0-FBE7ABD4CB29}"/>
+              </a:ext>
+            </a:extLst>
+          </p:cNvPr>
+          <p:cNvPicPr>
+            <a:picLocks noChangeAspect="1"/>
+          </p:cNvPicPr>
+          <p:nvPr/>
+        </p:nvPicPr>
+        <p:blipFill>
+          <a:blip r:embed="rId3"/>
+          <a:stretch>
+            <a:fillRect/>
+          </a:stretch>
+        </p:blipFill>
+        <p:spPr>
+          <a:xfrm>
+            <a:off x="2470999" y="3135472"/>
+            <a:ext cx="1076320" cy="1310147"/>
+          </a:xfrm>
+          <a:prstGeom prst="rect">
+            <a:avLst/>
+          </a:prstGeom>
+        </p:spPr>
+      </p:pic>
+      <p:sp>
+        <p:nvSpPr>
+          <p:cNvPr id="13" name="Partial Circle 12">
+            <a:extLst>
+              <a:ext uri="{FF2B5EF4-FFF2-40B4-BE49-F238E27FC236}">
+                <a16:creationId xmlns:a16="http://schemas.microsoft.com/office/drawing/2014/main" id="{51B2876B-20A8-544D-BFE1-DDAEE147F4C0}"/>
               </a:ext>
             </a:extLst>
           </p:cNvPr>
@@ -4704,18 +5829,18 @@
           <p:nvPr/>
         </p:nvSpPr>
         <p:spPr>
-          <a:xfrm rot="18847305">
-            <a:off x="1133168" y="2820208"/>
-            <a:ext cx="3027286" cy="2565647"/>
+          <a:xfrm rot="17686702">
+            <a:off x="-2216538" y="668582"/>
+            <a:ext cx="11003862" cy="6891253"/>
           </a:xfrm>
           <a:prstGeom prst="pie">
             <a:avLst>
-              <a:gd name="adj1" fmla="val 18995286"/>
-              <a:gd name="adj2" fmla="val 75336"/>
+              <a:gd name="adj1" fmla="val 20169912"/>
+              <a:gd name="adj2" fmla="val 21166707"/>
             </a:avLst>
           </a:prstGeom>
           <a:solidFill>
-            <a:schemeClr val="accent4">
+            <a:schemeClr val="accent5">
               <a:alpha val="50000"/>
             </a:schemeClr>
           </a:solidFill>
@@ -4750,82 +5875,10 @@
           </a:p>
         </p:txBody>
       </p:sp>
-      <p:sp>
-        <p:nvSpPr>
-          <p:cNvPr id="24" name="TextBox 23">
-            <a:extLst>
-              <a:ext uri="{FF2B5EF4-FFF2-40B4-BE49-F238E27FC236}">
-                <a16:creationId xmlns:a16="http://schemas.microsoft.com/office/drawing/2014/main" id="{5972C598-F924-5A10-B4BF-B7672EA4D8D4}"/>
-              </a:ext>
-            </a:extLst>
-          </p:cNvPr>
-          <p:cNvSpPr txBox="1"/>
-          <p:nvPr/>
-        </p:nvSpPr>
-        <p:spPr>
-          <a:xfrm>
-            <a:off x="2779059" y="3257266"/>
-            <a:ext cx="824753" cy="369332"/>
-          </a:xfrm>
-          <a:prstGeom prst="rect">
-            <a:avLst/>
-          </a:prstGeom>
-          <a:noFill/>
-        </p:spPr>
-        <p:txBody>
-          <a:bodyPr wrap="square">
-            <a:spAutoFit/>
-          </a:bodyPr>
-          <a:lstStyle/>
-          <a:p>
-            <a:r>
-              <a:rPr lang="el-GR" b="0" i="0" dirty="0">
-                <a:solidFill>
-                  <a:srgbClr val="1F1F1F"/>
-                </a:solidFill>
-                <a:effectLst/>
-                <a:latin typeface="Google Sans"/>
-              </a:rPr>
-              <a:t>θ</a:t>
-            </a:r>
-            <a:endParaRPr lang="en-GB" dirty="0"/>
-          </a:p>
-        </p:txBody>
-      </p:sp>
-      <p:pic>
-        <p:nvPicPr>
-          <p:cNvPr id="28" name="Picture 27">
-            <a:extLst>
-              <a:ext uri="{FF2B5EF4-FFF2-40B4-BE49-F238E27FC236}">
-                <a16:creationId xmlns:a16="http://schemas.microsoft.com/office/drawing/2014/main" id="{2D27D9B4-1F91-DB48-C6DB-6E06BC3288F2}"/>
-              </a:ext>
-            </a:extLst>
-          </p:cNvPr>
-          <p:cNvPicPr>
-            <a:picLocks noChangeAspect="1"/>
-          </p:cNvPicPr>
-          <p:nvPr/>
-        </p:nvPicPr>
-        <p:blipFill>
-          <a:blip r:embed="rId3"/>
-          <a:stretch>
-            <a:fillRect/>
-          </a:stretch>
-        </p:blipFill>
-        <p:spPr>
-          <a:xfrm>
-            <a:off x="5969938" y="1255059"/>
-            <a:ext cx="5549918" cy="3626598"/>
-          </a:xfrm>
-          <a:prstGeom prst="rect">
-            <a:avLst/>
-          </a:prstGeom>
-        </p:spPr>
-      </p:pic>
     </p:spTree>
     <p:extLst>
       <p:ext uri="{BB962C8B-B14F-4D97-AF65-F5344CB8AC3E}">
-        <p14:creationId xmlns:p14="http://schemas.microsoft.com/office/powerpoint/2010/main" val="2212838489"/>
+        <p14:creationId xmlns:p14="http://schemas.microsoft.com/office/powerpoint/2010/main" val="1206589478"/>
       </p:ext>
     </p:extLst>
   </p:cSld>
@@ -4854,10 +5907,10 @@
       </p:grpSpPr>
       <p:pic>
         <p:nvPicPr>
-          <p:cNvPr id="31" name="Picture 30">
-            <a:extLst>
-              <a:ext uri="{FF2B5EF4-FFF2-40B4-BE49-F238E27FC236}">
-                <a16:creationId xmlns:a16="http://schemas.microsoft.com/office/drawing/2014/main" id="{28C5B835-11A7-0A12-0506-C2E7A1115DA2}"/>
+          <p:cNvPr id="17" name="Picture 16">
+            <a:extLst>
+              <a:ext uri="{FF2B5EF4-FFF2-40B4-BE49-F238E27FC236}">
+                <a16:creationId xmlns:a16="http://schemas.microsoft.com/office/drawing/2014/main" id="{5313B34E-4A6C-ADB7-17D2-7951ACE02F23}"/>
               </a:ext>
             </a:extLst>
           </p:cNvPr>
@@ -4874,8 +5927,8 @@
         </p:blipFill>
         <p:spPr>
           <a:xfrm>
-            <a:off x="18673" y="0"/>
-            <a:ext cx="12173327" cy="6761216"/>
+            <a:off x="3921859" y="4634951"/>
+            <a:ext cx="4140694" cy="2342544"/>
           </a:xfrm>
           <a:prstGeom prst="rect">
             <a:avLst/>
@@ -4884,20 +5937,22 @@
       </p:pic>
       <p:cxnSp>
         <p:nvCxnSpPr>
-          <p:cNvPr id="5" name="Straight Arrow Connector 4">
-            <a:extLst>
-              <a:ext uri="{FF2B5EF4-FFF2-40B4-BE49-F238E27FC236}">
-                <a16:creationId xmlns:a16="http://schemas.microsoft.com/office/drawing/2014/main" id="{5DC2A680-BD5B-AAA2-D3C3-02510F74E0AF}"/>
-              </a:ext>
-            </a:extLst>
-          </p:cNvPr>
-          <p:cNvCxnSpPr/>
+          <p:cNvPr id="16" name="Straight Arrow Connector 15">
+            <a:extLst>
+              <a:ext uri="{FF2B5EF4-FFF2-40B4-BE49-F238E27FC236}">
+                <a16:creationId xmlns:a16="http://schemas.microsoft.com/office/drawing/2014/main" id="{10204F82-45AB-FA18-AF95-DF0ACDE62635}"/>
+              </a:ext>
+            </a:extLst>
+          </p:cNvPr>
+          <p:cNvCxnSpPr>
+            <a:cxnSpLocks/>
+          </p:cNvCxnSpPr>
           <p:nvPr/>
         </p:nvCxnSpPr>
         <p:spPr>
           <a:xfrm>
-            <a:off x="1059365" y="1929161"/>
-            <a:ext cx="0" cy="2520175"/>
+            <a:off x="4684308" y="-3880843"/>
+            <a:ext cx="0" cy="8722065"/>
           </a:xfrm>
           <a:prstGeom prst="straightConnector1">
             <a:avLst/>
@@ -4922,51 +5977,12 @@
           </a:fontRef>
         </p:style>
       </p:cxnSp>
-      <p:cxnSp>
-        <p:nvCxnSpPr>
-          <p:cNvPr id="9" name="Straight Connector 8">
-            <a:extLst>
-              <a:ext uri="{FF2B5EF4-FFF2-40B4-BE49-F238E27FC236}">
-                <a16:creationId xmlns:a16="http://schemas.microsoft.com/office/drawing/2014/main" id="{873BD22B-9FA2-44FE-D217-5D62C3E187DF}"/>
-              </a:ext>
-            </a:extLst>
-          </p:cNvPr>
-          <p:cNvCxnSpPr/>
-          <p:nvPr/>
-        </p:nvCxnSpPr>
-        <p:spPr>
-          <a:xfrm>
-            <a:off x="0" y="1906859"/>
-            <a:ext cx="3412273" cy="0"/>
-          </a:xfrm>
-          <a:prstGeom prst="line">
-            <a:avLst/>
-          </a:prstGeom>
-          <a:ln w="38100">
-            <a:prstDash val="sysDash"/>
-          </a:ln>
-        </p:spPr>
-        <p:style>
-          <a:lnRef idx="2">
-            <a:schemeClr val="dk1"/>
-          </a:lnRef>
-          <a:fillRef idx="0">
-            <a:schemeClr val="dk1"/>
-          </a:fillRef>
-          <a:effectRef idx="1">
-            <a:schemeClr val="dk1"/>
-          </a:effectRef>
-          <a:fontRef idx="minor">
-            <a:schemeClr val="tx1"/>
-          </a:fontRef>
-        </p:style>
-      </p:cxnSp>
-      <p:sp>
-        <p:nvSpPr>
-          <p:cNvPr id="10" name="TextBox 9">
-            <a:extLst>
-              <a:ext uri="{FF2B5EF4-FFF2-40B4-BE49-F238E27FC236}">
-                <a16:creationId xmlns:a16="http://schemas.microsoft.com/office/drawing/2014/main" id="{7912EA06-DA2A-E204-59C3-D4B020DFDC0F}"/>
+      <p:sp>
+        <p:nvSpPr>
+          <p:cNvPr id="18" name="TextBox 17">
+            <a:extLst>
+              <a:ext uri="{FF2B5EF4-FFF2-40B4-BE49-F238E27FC236}">
+                <a16:creationId xmlns:a16="http://schemas.microsoft.com/office/drawing/2014/main" id="{BEA5986D-D1F2-B364-17F7-C03C358C9823}"/>
               </a:ext>
             </a:extLst>
           </p:cNvPr>
@@ -4975,8 +5991,8 @@
         </p:nvSpPr>
         <p:spPr>
           <a:xfrm>
-            <a:off x="0" y="3380608"/>
-            <a:ext cx="814039" cy="369332"/>
+            <a:off x="3369129" y="2204950"/>
+            <a:ext cx="2726871" cy="707886"/>
           </a:xfrm>
           <a:prstGeom prst="rect">
             <a:avLst/>
@@ -4990,57 +6006,18 @@
           <a:lstStyle/>
           <a:p>
             <a:r>
-              <a:rPr lang="en-GB" dirty="0"/>
-              <a:t>4.84m</a:t>
-            </a:r>
-          </a:p>
-        </p:txBody>
-      </p:sp>
-      <p:cxnSp>
-        <p:nvCxnSpPr>
-          <p:cNvPr id="11" name="Straight Connector 10">
-            <a:extLst>
-              <a:ext uri="{FF2B5EF4-FFF2-40B4-BE49-F238E27FC236}">
-                <a16:creationId xmlns:a16="http://schemas.microsoft.com/office/drawing/2014/main" id="{4F5B2027-5032-3197-1B43-E785490BFD76}"/>
-              </a:ext>
-            </a:extLst>
-          </p:cNvPr>
-          <p:cNvCxnSpPr/>
-          <p:nvPr/>
-        </p:nvCxnSpPr>
-        <p:spPr>
-          <a:xfrm>
-            <a:off x="18673" y="4445619"/>
-            <a:ext cx="3412273" cy="0"/>
-          </a:xfrm>
-          <a:prstGeom prst="line">
-            <a:avLst/>
-          </a:prstGeom>
-          <a:ln w="38100">
-            <a:prstDash val="sysDash"/>
-          </a:ln>
-        </p:spPr>
-        <p:style>
-          <a:lnRef idx="2">
-            <a:schemeClr val="dk1"/>
-          </a:lnRef>
-          <a:fillRef idx="0">
-            <a:schemeClr val="dk1"/>
-          </a:fillRef>
-          <a:effectRef idx="1">
-            <a:schemeClr val="dk1"/>
-          </a:effectRef>
-          <a:fontRef idx="minor">
-            <a:schemeClr val="tx1"/>
-          </a:fontRef>
-        </p:style>
-      </p:cxnSp>
+              <a:rPr lang="en-GB" sz="4000" dirty="0"/>
+              <a:t>56m</a:t>
+            </a:r>
+          </a:p>
+        </p:txBody>
+      </p:sp>
       <p:pic>
         <p:nvPicPr>
-          <p:cNvPr id="4" name="Picture 3">
-            <a:extLst>
-              <a:ext uri="{FF2B5EF4-FFF2-40B4-BE49-F238E27FC236}">
-                <a16:creationId xmlns:a16="http://schemas.microsoft.com/office/drawing/2014/main" id="{4FEA4B33-4DA3-E6E6-F5B0-FBE7ABD4CB29}"/>
+          <p:cNvPr id="3" name="Picture 2">
+            <a:extLst>
+              <a:ext uri="{FF2B5EF4-FFF2-40B4-BE49-F238E27FC236}">
+                <a16:creationId xmlns:a16="http://schemas.microsoft.com/office/drawing/2014/main" id="{767F3E25-6C9E-A47F-E5FE-529C7D9A7726}"/>
               </a:ext>
             </a:extLst>
           </p:cNvPr>
@@ -5049,16 +6026,15 @@
           </p:cNvPicPr>
           <p:nvPr/>
         </p:nvPicPr>
-        <p:blipFill>
+        <p:blipFill rotWithShape="1">
           <a:blip r:embed="rId3"/>
-          <a:stretch>
-            <a:fillRect/>
-          </a:stretch>
+          <a:srcRect b="9165"/>
+          <a:stretch/>
         </p:blipFill>
         <p:spPr>
           <a:xfrm>
-            <a:off x="2470999" y="3135472"/>
-            <a:ext cx="1076320" cy="1310147"/>
+            <a:off x="4920652" y="-4677856"/>
+            <a:ext cx="3373116" cy="9519078"/>
           </a:xfrm>
           <a:prstGeom prst="rect">
             <a:avLst/>
@@ -5067,10 +6043,10 @@
       </p:pic>
       <p:sp>
         <p:nvSpPr>
-          <p:cNvPr id="13" name="Partial Circle 12">
-            <a:extLst>
-              <a:ext uri="{FF2B5EF4-FFF2-40B4-BE49-F238E27FC236}">
-                <a16:creationId xmlns:a16="http://schemas.microsoft.com/office/drawing/2014/main" id="{51B2876B-20A8-544D-BFE1-DDAEE147F4C0}"/>
+          <p:cNvPr id="15" name="Partial Circle 14">
+            <a:extLst>
+              <a:ext uri="{FF2B5EF4-FFF2-40B4-BE49-F238E27FC236}">
+                <a16:creationId xmlns:a16="http://schemas.microsoft.com/office/drawing/2014/main" id="{3E35A02F-124E-8A2D-5BF6-FE241EAB7B5C}"/>
               </a:ext>
             </a:extLst>
           </p:cNvPr>
@@ -5079,13 +6055,13 @@
         </p:nvSpPr>
         <p:spPr>
           <a:xfrm rot="17686702">
-            <a:off x="-2216538" y="668582"/>
-            <a:ext cx="11003862" cy="6891253"/>
+            <a:off x="-4051458" y="-3289741"/>
+            <a:ext cx="18183261" cy="18843070"/>
           </a:xfrm>
           <a:prstGeom prst="pie">
             <a:avLst>
-              <a:gd name="adj1" fmla="val 20169912"/>
-              <a:gd name="adj2" fmla="val 21166707"/>
+              <a:gd name="adj1" fmla="val 20117571"/>
+              <a:gd name="adj2" fmla="val 20515285"/>
             </a:avLst>
           </a:prstGeom>
           <a:solidFill>
@@ -5127,7 +6103,7 @@
     </p:spTree>
     <p:extLst>
       <p:ext uri="{BB962C8B-B14F-4D97-AF65-F5344CB8AC3E}">
-        <p14:creationId xmlns:p14="http://schemas.microsoft.com/office/powerpoint/2010/main" val="1206589478"/>
+        <p14:creationId xmlns:p14="http://schemas.microsoft.com/office/powerpoint/2010/main" val="3649896188"/>
       </p:ext>
     </p:extLst>
   </p:cSld>
@@ -5156,10 +6132,10 @@
       </p:grpSpPr>
       <p:pic>
         <p:nvPicPr>
-          <p:cNvPr id="17" name="Picture 16">
-            <a:extLst>
-              <a:ext uri="{FF2B5EF4-FFF2-40B4-BE49-F238E27FC236}">
-                <a16:creationId xmlns:a16="http://schemas.microsoft.com/office/drawing/2014/main" id="{5313B34E-4A6C-ADB7-17D2-7951ACE02F23}"/>
+          <p:cNvPr id="2" name="Picture 1">
+            <a:extLst>
+              <a:ext uri="{FF2B5EF4-FFF2-40B4-BE49-F238E27FC236}">
+                <a16:creationId xmlns:a16="http://schemas.microsoft.com/office/drawing/2014/main" id="{9F0CEFF2-E3BF-ADAB-6812-7D62BD6245A1}"/>
               </a:ext>
             </a:extLst>
           </p:cNvPr>
@@ -5175,9 +6151,9 @@
           </a:stretch>
         </p:blipFill>
         <p:spPr>
-          <a:xfrm>
-            <a:off x="3921859" y="4634951"/>
-            <a:ext cx="4140694" cy="2342544"/>
+          <a:xfrm rot="18980188">
+            <a:off x="1040731" y="2292985"/>
+            <a:ext cx="2912578" cy="2850709"/>
           </a:xfrm>
           <a:prstGeom prst="rect">
             <a:avLst/>
@@ -5186,10 +6162,10 @@
       </p:pic>
       <p:cxnSp>
         <p:nvCxnSpPr>
-          <p:cNvPr id="16" name="Straight Arrow Connector 15">
-            <a:extLst>
-              <a:ext uri="{FF2B5EF4-FFF2-40B4-BE49-F238E27FC236}">
-                <a16:creationId xmlns:a16="http://schemas.microsoft.com/office/drawing/2014/main" id="{10204F82-45AB-FA18-AF95-DF0ACDE62635}"/>
+          <p:cNvPr id="3" name="Straight Arrow Connector 2">
+            <a:extLst>
+              <a:ext uri="{FF2B5EF4-FFF2-40B4-BE49-F238E27FC236}">
+                <a16:creationId xmlns:a16="http://schemas.microsoft.com/office/drawing/2014/main" id="{AC6DE8B2-E30B-6C90-2678-998223455EA9}"/>
               </a:ext>
             </a:extLst>
           </p:cNvPr>
@@ -5199,15 +6175,169 @@
           <p:nvPr/>
         </p:nvCxnSpPr>
         <p:spPr>
-          <a:xfrm>
-            <a:off x="4684308" y="-3880843"/>
-            <a:ext cx="0" cy="8722065"/>
+          <a:xfrm flipV="1">
+            <a:off x="583974" y="1833999"/>
+            <a:ext cx="1778393" cy="1612685"/>
           </a:xfrm>
           <a:prstGeom prst="straightConnector1">
             <a:avLst/>
           </a:prstGeom>
-          <a:ln w="76200">
-            <a:headEnd type="triangle"/>
+          <a:ln>
+            <a:tailEnd type="triangle"/>
+          </a:ln>
+        </p:spPr>
+        <p:style>
+          <a:lnRef idx="2">
+            <a:schemeClr val="accent1"/>
+          </a:lnRef>
+          <a:fillRef idx="0">
+            <a:schemeClr val="accent1"/>
+          </a:fillRef>
+          <a:effectRef idx="1">
+            <a:schemeClr val="accent1"/>
+          </a:effectRef>
+          <a:fontRef idx="minor">
+            <a:schemeClr val="tx1"/>
+          </a:fontRef>
+        </p:style>
+      </p:cxnSp>
+      <p:sp>
+        <p:nvSpPr>
+          <p:cNvPr id="4" name="TextBox 3">
+            <a:extLst>
+              <a:ext uri="{FF2B5EF4-FFF2-40B4-BE49-F238E27FC236}">
+                <a16:creationId xmlns:a16="http://schemas.microsoft.com/office/drawing/2014/main" id="{36626EAF-6B57-F562-3DFA-C71AD8EFC9B7}"/>
+              </a:ext>
+            </a:extLst>
+          </p:cNvPr>
+          <p:cNvSpPr txBox="1"/>
+          <p:nvPr/>
+        </p:nvSpPr>
+        <p:spPr>
+          <a:xfrm>
+            <a:off x="252153" y="2107707"/>
+            <a:ext cx="1471044" cy="369332"/>
+          </a:xfrm>
+          <a:prstGeom prst="rect">
+            <a:avLst/>
+          </a:prstGeom>
+          <a:noFill/>
+        </p:spPr>
+        <p:txBody>
+          <a:bodyPr wrap="none" rtlCol="0">
+            <a:spAutoFit/>
+          </a:bodyPr>
+          <a:lstStyle/>
+          <a:p>
+            <a:r>
+              <a:rPr lang="en-GB" dirty="0"/>
+              <a:t>Eta Direction</a:t>
+            </a:r>
+          </a:p>
+        </p:txBody>
+      </p:sp>
+      <p:sp>
+        <p:nvSpPr>
+          <p:cNvPr id="5" name="Flowchart: Connector 4">
+            <a:extLst>
+              <a:ext uri="{FF2B5EF4-FFF2-40B4-BE49-F238E27FC236}">
+                <a16:creationId xmlns:a16="http://schemas.microsoft.com/office/drawing/2014/main" id="{2F1FA5F7-E022-1060-7C22-861073097348}"/>
+              </a:ext>
+            </a:extLst>
+          </p:cNvPr>
+          <p:cNvSpPr/>
+          <p:nvPr/>
+        </p:nvSpPr>
+        <p:spPr>
+          <a:xfrm>
+            <a:off x="1874096" y="5207779"/>
+            <a:ext cx="204186" cy="213064"/>
+          </a:xfrm>
+          <a:prstGeom prst="flowChartConnector">
+            <a:avLst/>
+          </a:prstGeom>
+        </p:spPr>
+        <p:style>
+          <a:lnRef idx="2">
+            <a:schemeClr val="dk1">
+              <a:shade val="15000"/>
+            </a:schemeClr>
+          </a:lnRef>
+          <a:fillRef idx="1">
+            <a:schemeClr val="dk1"/>
+          </a:fillRef>
+          <a:effectRef idx="0">
+            <a:schemeClr val="dk1"/>
+          </a:effectRef>
+          <a:fontRef idx="minor">
+            <a:schemeClr val="lt1"/>
+          </a:fontRef>
+        </p:style>
+        <p:txBody>
+          <a:bodyPr rtlCol="0" anchor="ctr"/>
+          <a:lstStyle/>
+          <a:p>
+            <a:pPr algn="ctr"/>
+            <a:endParaRPr lang="en-GB"/>
+          </a:p>
+        </p:txBody>
+      </p:sp>
+      <p:sp>
+        <p:nvSpPr>
+          <p:cNvPr id="6" name="TextBox 5">
+            <a:extLst>
+              <a:ext uri="{FF2B5EF4-FFF2-40B4-BE49-F238E27FC236}">
+                <a16:creationId xmlns:a16="http://schemas.microsoft.com/office/drawing/2014/main" id="{136ECD90-74ED-A206-34B5-FB3486A6DDED}"/>
+              </a:ext>
+            </a:extLst>
+          </p:cNvPr>
+          <p:cNvSpPr txBox="1"/>
+          <p:nvPr/>
+        </p:nvSpPr>
+        <p:spPr>
+          <a:xfrm>
+            <a:off x="1199392" y="5184728"/>
+            <a:ext cx="1162975" cy="646331"/>
+          </a:xfrm>
+          <a:prstGeom prst="rect">
+            <a:avLst/>
+          </a:prstGeom>
+          <a:noFill/>
+        </p:spPr>
+        <p:txBody>
+          <a:bodyPr wrap="square" rtlCol="0">
+            <a:spAutoFit/>
+          </a:bodyPr>
+          <a:lstStyle/>
+          <a:p>
+            <a:r>
+              <a:rPr lang="en-GB" dirty="0"/>
+              <a:t>Phi Direction</a:t>
+            </a:r>
+          </a:p>
+        </p:txBody>
+      </p:sp>
+      <p:cxnSp>
+        <p:nvCxnSpPr>
+          <p:cNvPr id="7" name="Straight Arrow Connector 6">
+            <a:extLst>
+              <a:ext uri="{FF2B5EF4-FFF2-40B4-BE49-F238E27FC236}">
+                <a16:creationId xmlns:a16="http://schemas.microsoft.com/office/drawing/2014/main" id="{0A9A52CD-A072-98FB-E10A-028764651BFB}"/>
+              </a:ext>
+            </a:extLst>
+          </p:cNvPr>
+          <p:cNvCxnSpPr/>
+          <p:nvPr/>
+        </p:nvCxnSpPr>
+        <p:spPr>
+          <a:xfrm flipH="1" flipV="1">
+            <a:off x="1928919" y="2943973"/>
+            <a:ext cx="1435068" cy="1633491"/>
+          </a:xfrm>
+          <a:prstGeom prst="straightConnector1">
+            <a:avLst/>
+          </a:prstGeom>
+          <a:ln w="57150">
             <a:tailEnd type="triangle"/>
           </a:ln>
         </p:spPr>
@@ -5228,10 +6358,10 @@
       </p:cxnSp>
       <p:sp>
         <p:nvSpPr>
-          <p:cNvPr id="18" name="TextBox 17">
-            <a:extLst>
-              <a:ext uri="{FF2B5EF4-FFF2-40B4-BE49-F238E27FC236}">
-                <a16:creationId xmlns:a16="http://schemas.microsoft.com/office/drawing/2014/main" id="{BEA5986D-D1F2-B364-17F7-C03C358C9823}"/>
+          <p:cNvPr id="8" name="TextBox 7">
+            <a:extLst>
+              <a:ext uri="{FF2B5EF4-FFF2-40B4-BE49-F238E27FC236}">
+                <a16:creationId xmlns:a16="http://schemas.microsoft.com/office/drawing/2014/main" id="{F39B3AFC-48BD-0234-99E8-4151E7555F32}"/>
               </a:ext>
             </a:extLst>
           </p:cNvPr>
@@ -5240,8 +6370,8 @@
         </p:nvSpPr>
         <p:spPr>
           <a:xfrm>
-            <a:off x="3369129" y="2204950"/>
-            <a:ext cx="2726871" cy="707886"/>
+            <a:off x="2779524" y="5031220"/>
+            <a:ext cx="871459" cy="378565"/>
           </a:xfrm>
           <a:prstGeom prst="rect">
             <a:avLst/>
@@ -5254,48 +6384,88 @@
           </a:bodyPr>
           <a:lstStyle/>
           <a:p>
-            <a:r>
-              <a:rPr lang="en-GB" sz="4000" dirty="0"/>
-              <a:t>56m</a:t>
-            </a:r>
-          </a:p>
-        </p:txBody>
-      </p:sp>
-      <p:pic>
-        <p:nvPicPr>
-          <p:cNvPr id="3" name="Picture 2">
-            <a:extLst>
-              <a:ext uri="{FF2B5EF4-FFF2-40B4-BE49-F238E27FC236}">
-                <a16:creationId xmlns:a16="http://schemas.microsoft.com/office/drawing/2014/main" id="{767F3E25-6C9E-A47F-E5FE-529C7D9A7726}"/>
-              </a:ext>
-            </a:extLst>
-          </p:cNvPr>
-          <p:cNvPicPr>
-            <a:picLocks noChangeAspect="1"/>
-          </p:cNvPicPr>
+            <a:pPr>
+              <a:lnSpc>
+                <a:spcPct val="107000"/>
+              </a:lnSpc>
+              <a:spcAft>
+                <a:spcPts val="800"/>
+              </a:spcAft>
+            </a:pPr>
+            <a:r>
+              <a:rPr lang="en-GB" sz="1800" kern="100" dirty="0">
+                <a:effectLst/>
+                <a:latin typeface="Aptos" panose="020B0004020202020204" pitchFamily="34" charset="0"/>
+                <a:ea typeface="Aptos" panose="020B0004020202020204" pitchFamily="34" charset="0"/>
+                <a:cs typeface="Times New Roman" panose="02020603050405020304" pitchFamily="18" charset="0"/>
+              </a:rPr>
+              <a:t>45</a:t>
+            </a:r>
+            <a:r>
+              <a:rPr lang="en-GB" sz="1800" kern="100" baseline="30000" dirty="0">
+                <a:effectLst/>
+                <a:latin typeface="Aptos" panose="020B0004020202020204" pitchFamily="34" charset="0"/>
+                <a:ea typeface="Aptos" panose="020B0004020202020204" pitchFamily="34" charset="0"/>
+                <a:cs typeface="Times New Roman" panose="02020603050405020304" pitchFamily="18" charset="0"/>
+              </a:rPr>
+              <a:t>0</a:t>
+            </a:r>
+            <a:endParaRPr lang="en-GB" sz="1800" kern="100" dirty="0">
+              <a:effectLst/>
+              <a:latin typeface="Aptos" panose="020B0004020202020204" pitchFamily="34" charset="0"/>
+              <a:ea typeface="Aptos" panose="020B0004020202020204" pitchFamily="34" charset="0"/>
+              <a:cs typeface="Times New Roman" panose="02020603050405020304" pitchFamily="18" charset="0"/>
+            </a:endParaRPr>
+          </a:p>
+        </p:txBody>
+      </p:sp>
+      <p:cxnSp>
+        <p:nvCxnSpPr>
+          <p:cNvPr id="10" name="Straight Arrow Connector 9">
+            <a:extLst>
+              <a:ext uri="{FF2B5EF4-FFF2-40B4-BE49-F238E27FC236}">
+                <a16:creationId xmlns:a16="http://schemas.microsoft.com/office/drawing/2014/main" id="{C5B1A510-7653-EBF4-AEE6-92F8132AC2C7}"/>
+              </a:ext>
+            </a:extLst>
+          </p:cNvPr>
+          <p:cNvCxnSpPr>
+            <a:cxnSpLocks/>
+          </p:cNvCxnSpPr>
           <p:nvPr/>
-        </p:nvPicPr>
-        <p:blipFill rotWithShape="1">
-          <a:blip r:embed="rId3"/>
-          <a:srcRect b="9165"/>
-          <a:stretch/>
-        </p:blipFill>
-        <p:spPr>
-          <a:xfrm>
-            <a:off x="4920652" y="-4677856"/>
-            <a:ext cx="3373116" cy="9519078"/>
-          </a:xfrm>
-          <a:prstGeom prst="rect">
+        </p:nvCxnSpPr>
+        <p:spPr>
+          <a:xfrm flipV="1">
+            <a:off x="3356337" y="1448215"/>
+            <a:ext cx="0" cy="4059678"/>
+          </a:xfrm>
+          <a:prstGeom prst="straightConnector1">
             <a:avLst/>
           </a:prstGeom>
-        </p:spPr>
-      </p:pic>
-      <p:sp>
-        <p:nvSpPr>
-          <p:cNvPr id="15" name="Partial Circle 14">
-            <a:extLst>
-              <a:ext uri="{FF2B5EF4-FFF2-40B4-BE49-F238E27FC236}">
-                <a16:creationId xmlns:a16="http://schemas.microsoft.com/office/drawing/2014/main" id="{3E35A02F-124E-8A2D-5BF6-FE241EAB7B5C}"/>
+          <a:ln w="57150">
+            <a:tailEnd type="triangle"/>
+          </a:ln>
+        </p:spPr>
+        <p:style>
+          <a:lnRef idx="2">
+            <a:schemeClr val="dk1"/>
+          </a:lnRef>
+          <a:fillRef idx="0">
+            <a:schemeClr val="dk1"/>
+          </a:fillRef>
+          <a:effectRef idx="1">
+            <a:schemeClr val="dk1"/>
+          </a:effectRef>
+          <a:fontRef idx="minor">
+            <a:schemeClr val="tx1"/>
+          </a:fontRef>
+        </p:style>
+      </p:cxnSp>
+      <p:sp>
+        <p:nvSpPr>
+          <p:cNvPr id="12" name="Partial Circle 11">
+            <a:extLst>
+              <a:ext uri="{FF2B5EF4-FFF2-40B4-BE49-F238E27FC236}">
+                <a16:creationId xmlns:a16="http://schemas.microsoft.com/office/drawing/2014/main" id="{34161164-438C-7E3A-2DC8-EC367242B363}"/>
               </a:ext>
             </a:extLst>
           </p:cNvPr>
@@ -5303,18 +6473,18 @@
           <p:nvPr/>
         </p:nvSpPr>
         <p:spPr>
-          <a:xfrm rot="17686702">
-            <a:off x="-4051458" y="-3289741"/>
-            <a:ext cx="18183261" cy="18843070"/>
+          <a:xfrm>
+            <a:off x="923267" y="4202706"/>
+            <a:ext cx="3027286" cy="2565647"/>
           </a:xfrm>
           <a:prstGeom prst="pie">
             <a:avLst>
-              <a:gd name="adj1" fmla="val 20117571"/>
-              <a:gd name="adj2" fmla="val 20515285"/>
+              <a:gd name="adj1" fmla="val 18995286"/>
+              <a:gd name="adj2" fmla="val 75336"/>
             </a:avLst>
           </a:prstGeom>
           <a:solidFill>
-            <a:schemeClr val="accent5">
+            <a:schemeClr val="accent4">
               <a:alpha val="50000"/>
             </a:schemeClr>
           </a:solidFill>
@@ -5352,7 +6522,7 @@
     </p:spTree>
     <p:extLst>
       <p:ext uri="{BB962C8B-B14F-4D97-AF65-F5344CB8AC3E}">
-        <p14:creationId xmlns:p14="http://schemas.microsoft.com/office/powerpoint/2010/main" val="3649896188"/>
+        <p14:creationId xmlns:p14="http://schemas.microsoft.com/office/powerpoint/2010/main" val="3801166290"/>
       </p:ext>
     </p:extLst>
   </p:cSld>

</xml_diff>